<commit_message>
Documentation, and test mission video + optimizations
</commit_message>
<xml_diff>
--- a/Presentations/DCS World - MOOSE - Development - Part 3 - The DATABASE - UNIT - CLIENT - GROUP - ZONE, .pptx
+++ b/Presentations/DCS World - MOOSE - Development - Part 3 - The DATABASE - UNIT - CLIENT - GROUP - ZONE, .pptx
@@ -367,7 +367,7 @@
           <a:p>
             <a:fld id="{4FAB73BC-B049-4115-A692-8D63A059BFB8}" type="slidenum">
               <a:rPr lang="en-US" dirty="0"/>
-              <a:t>‹#›</a:t>
+              <a:t>‹nr.›</a:t>
             </a:fld>
             <a:endParaRPr lang="en-US" dirty="0"/>
           </a:p>
@@ -532,7 +532,7 @@
           <a:p>
             <a:fld id="{4FAB73BC-B049-4115-A692-8D63A059BFB8}" type="slidenum">
               <a:rPr lang="en-US" dirty="0"/>
-              <a:t>‹#›</a:t>
+              <a:t>‹nr.›</a:t>
             </a:fld>
             <a:endParaRPr lang="en-US" dirty="0"/>
           </a:p>
@@ -760,7 +760,7 @@
           <a:p>
             <a:fld id="{4FAB73BC-B049-4115-A692-8D63A059BFB8}" type="slidenum">
               <a:rPr lang="en-US" dirty="0"/>
-              <a:t>‹#›</a:t>
+              <a:t>‹nr.›</a:t>
             </a:fld>
             <a:endParaRPr lang="en-US" dirty="0"/>
           </a:p>
@@ -963,7 +963,7 @@
           <a:p>
             <a:fld id="{4FAB73BC-B049-4115-A692-8D63A059BFB8}" type="slidenum">
               <a:rPr lang="en-US" dirty="0"/>
-              <a:t>‹#›</a:t>
+              <a:t>‹nr.›</a:t>
             </a:fld>
             <a:endParaRPr lang="en-US" dirty="0"/>
           </a:p>
@@ -1504,7 +1504,7 @@
           <a:p>
             <a:fld id="{4FAB73BC-B049-4115-A692-8D63A059BFB8}" type="slidenum">
               <a:rPr lang="en-US" dirty="0"/>
-              <a:t>‹#›</a:t>
+              <a:t>‹nr.›</a:t>
             </a:fld>
             <a:endParaRPr lang="en-US" dirty="0"/>
           </a:p>
@@ -1921,7 +1921,7 @@
           <a:p>
             <a:fld id="{4FAB73BC-B049-4115-A692-8D63A059BFB8}" type="slidenum">
               <a:rPr lang="en-US" dirty="0"/>
-              <a:t>‹#›</a:t>
+              <a:t>‹nr.›</a:t>
             </a:fld>
             <a:endParaRPr lang="en-US" dirty="0"/>
           </a:p>
@@ -2100,7 +2100,7 @@
           <a:p>
             <a:fld id="{4FAB73BC-B049-4115-A692-8D63A059BFB8}" type="slidenum">
               <a:rPr lang="en-US" dirty="0"/>
-              <a:t>‹#›</a:t>
+              <a:t>‹nr.›</a:t>
             </a:fld>
             <a:endParaRPr lang="en-US" dirty="0"/>
           </a:p>
@@ -2368,7 +2368,7 @@
           <a:p>
             <a:fld id="{4FAB73BC-B049-4115-A692-8D63A059BFB8}" type="slidenum">
               <a:rPr lang="en-US" dirty="0"/>
-              <a:t>‹#›</a:t>
+              <a:t>‹nr.›</a:t>
             </a:fld>
             <a:endParaRPr lang="en-US" dirty="0"/>
           </a:p>
@@ -2628,7 +2628,7 @@
           <a:p>
             <a:fld id="{4FAB73BC-B049-4115-A692-8D63A059BFB8}" type="slidenum">
               <a:rPr lang="en-US" dirty="0"/>
-              <a:t>‹#›</a:t>
+              <a:t>‹nr.›</a:t>
             </a:fld>
             <a:endParaRPr lang="en-US" dirty="0"/>
           </a:p>
@@ -2906,7 +2906,7 @@
             <a:fld id="{4FAB73BC-B049-4115-A692-8D63A059BFB8}" type="slidenum">
               <a:rPr lang="en-US" dirty="0"/>
               <a:pPr/>
-              <a:t>‹#›</a:t>
+              <a:t>‹nr.›</a:t>
             </a:fld>
             <a:endParaRPr lang="en-US" dirty="0"/>
           </a:p>
@@ -3367,13 +3367,6 @@
   <p:clrMapOvr>
     <a:masterClrMapping/>
   </p:clrMapOvr>
-  <p:timing>
-    <p:tnLst>
-      <p:par>
-        <p:cTn id="1" dur="indefinite" restart="never" nodeType="tmRoot"/>
-      </p:par>
-    </p:tnLst>
-  </p:timing>
 </p:sld>
 </file>
 
@@ -3440,7 +3433,7 @@
           <a:lstStyle/>
           <a:p>
             <a:r>
-              <a:rPr lang="nl-BE" sz="2800" dirty="0" smtClean="0">
+              <a:rPr lang="nl-BE" sz="2800" dirty="0">
                 <a:effectLst>
                   <a:outerShdw blurRad="38100" dist="38100" dir="2700000" algn="tl">
                     <a:srgbClr val="000000">
@@ -3753,7 +3746,7 @@
           <a:p>
             <a:pPr algn="ctr"/>
             <a:r>
-              <a:rPr lang="nl-BE" b="1" dirty="0" smtClean="0">
+              <a:rPr lang="nl-BE" b="1" dirty="0">
                 <a:solidFill>
                   <a:schemeClr val="accent1"/>
                 </a:solidFill>
@@ -3930,7 +3923,7 @@
           <a:p>
             <a:pPr algn="ctr"/>
             <a:r>
-              <a:rPr lang="nl-BE" b="1" dirty="0" smtClean="0">
+              <a:rPr lang="nl-BE" b="1" dirty="0">
                 <a:solidFill>
                   <a:schemeClr val="accent1"/>
                 </a:solidFill>
@@ -4032,18 +4025,14 @@
           </a:lstStyle>
           <a:p>
             <a:r>
-              <a:rPr lang="nl-BE" sz="1600" dirty="0" smtClean="0"/>
+              <a:rPr lang="nl-BE" sz="1600" dirty="0"/>
               <a:t>Wraps the DCS Unit objects.</a:t>
             </a:r>
           </a:p>
           <a:p>
             <a:r>
-              <a:rPr lang="nl-BE" sz="1600" dirty="0" smtClean="0"/>
-              <a:t>Units </a:t>
-            </a:r>
-            <a:r>
               <a:rPr lang="nl-BE" sz="1600" dirty="0"/>
-              <a:t>with skill level set to Player or Client.</a:t>
+              <a:t>Units with skill level set to Player or Client.</a:t>
             </a:r>
           </a:p>
           <a:p>
@@ -4147,7 +4136,7 @@
           <a:p>
             <a:pPr algn="ctr"/>
             <a:r>
-              <a:rPr lang="nl-BE" sz="1400" b="1" dirty="0" smtClean="0">
+              <a:rPr lang="nl-BE" sz="1400" b="1" dirty="0">
                 <a:solidFill>
                   <a:schemeClr val="tx1"/>
                 </a:solidFill>
@@ -4172,13 +4161,6 @@
   <p:clrMapOvr>
     <a:masterClrMapping/>
   </p:clrMapOvr>
-  <p:timing>
-    <p:tnLst>
-      <p:par>
-        <p:cTn id="1" dur="indefinite" restart="never" nodeType="tmRoot"/>
-      </p:par>
-    </p:tnLst>
-  </p:timing>
 </p:sld>
 </file>
 
@@ -4245,7 +4227,7 @@
           <a:lstStyle/>
           <a:p>
             <a:r>
-              <a:rPr lang="nl-BE" sz="2800" dirty="0" smtClean="0">
+              <a:rPr lang="nl-BE" sz="2800" dirty="0">
                 <a:effectLst>
                   <a:outerShdw blurRad="38100" dist="38100" dir="2700000" algn="tl">
                     <a:srgbClr val="000000">
@@ -4452,7 +4434,7 @@
           <a:p>
             <a:pPr algn="ctr"/>
             <a:r>
-              <a:rPr lang="nl-BE" b="1" dirty="0" smtClean="0">
+              <a:rPr lang="nl-BE" b="1" dirty="0">
                 <a:solidFill>
                   <a:schemeClr val="accent1"/>
                 </a:solidFill>
@@ -4558,7 +4540,7 @@
           <a:p>
             <a:pPr algn="ctr"/>
             <a:r>
-              <a:rPr lang="nl-BE" b="1" dirty="0" smtClean="0">
+              <a:rPr lang="nl-BE" b="1" dirty="0">
                 <a:solidFill>
                   <a:schemeClr val="accent1"/>
                 </a:solidFill>
@@ -4735,7 +4717,7 @@
           <a:p>
             <a:pPr algn="ctr"/>
             <a:r>
-              <a:rPr lang="nl-BE" b="1" dirty="0" smtClean="0">
+              <a:rPr lang="nl-BE" b="1" dirty="0">
                 <a:solidFill>
                   <a:schemeClr val="accent1"/>
                 </a:solidFill>
@@ -4833,7 +4815,7 @@
               <a:buChar char="-"/>
             </a:pPr>
             <a:r>
-              <a:rPr lang="nl-BE" sz="1600" dirty="0" smtClean="0"/>
+              <a:rPr lang="nl-BE" sz="1600" dirty="0"/>
               <a:t>Wraps the DCS Group objects.</a:t>
             </a:r>
           </a:p>
@@ -4843,7 +4825,7 @@
               <a:buChar char="-"/>
             </a:pPr>
             <a:r>
-              <a:rPr lang="nl-BE" sz="1600" dirty="0" smtClean="0"/>
+              <a:rPr lang="nl-BE" sz="1600" dirty="0"/>
               <a:t>Support all Group DCS APIs.</a:t>
             </a:r>
           </a:p>
@@ -4853,12 +4835,8 @@
               <a:buChar char="-"/>
             </a:pPr>
             <a:r>
-              <a:rPr lang="nl-BE" sz="1600" dirty="0" smtClean="0"/>
-              <a:t>Group specific </a:t>
-            </a:r>
-            <a:r>
               <a:rPr lang="nl-BE" sz="1600" dirty="0"/>
-              <a:t>APIs not in the DCS API set.</a:t>
+              <a:t>Group specific APIs not in the DCS API set.</a:t>
             </a:r>
           </a:p>
           <a:p>
@@ -4867,7 +4845,7 @@
               <a:buChar char="-"/>
             </a:pPr>
             <a:r>
-              <a:rPr lang="nl-BE" sz="1600" dirty="0" smtClean="0"/>
+              <a:rPr lang="nl-BE" sz="1600" dirty="0"/>
               <a:t>Take an abstraction of Group Controller.</a:t>
             </a:r>
           </a:p>
@@ -4877,7 +4855,7 @@
               <a:buChar char="-"/>
             </a:pPr>
             <a:r>
-              <a:rPr lang="nl-BE" sz="1600" dirty="0" smtClean="0"/>
+              <a:rPr lang="nl-BE" sz="1600" dirty="0"/>
               <a:t>Perform AI tasks, set options, ...</a:t>
             </a:r>
           </a:p>
@@ -4887,7 +4865,7 @@
               <a:buChar char="-"/>
             </a:pPr>
             <a:r>
-              <a:rPr lang="nl-BE" sz="1600" dirty="0" smtClean="0"/>
+              <a:rPr lang="nl-BE" sz="1600" dirty="0"/>
               <a:t>Control Group movement.</a:t>
             </a:r>
           </a:p>
@@ -4896,14 +4874,14 @@
               <a:buFontTx/>
               <a:buChar char="-"/>
             </a:pPr>
-            <a:endParaRPr lang="nl-BE" sz="1600" dirty="0" smtClean="0"/>
+            <a:endParaRPr lang="nl-BE" sz="1600" dirty="0"/>
           </a:p>
           <a:p>
             <a:pPr marL="285750" indent="-285750">
               <a:buFontTx/>
               <a:buChar char="-"/>
             </a:pPr>
-            <a:endParaRPr lang="nl-BE" sz="1600" dirty="0" smtClean="0"/>
+            <a:endParaRPr lang="nl-BE" sz="1600" dirty="0"/>
           </a:p>
         </p:txBody>
       </p:sp>
@@ -4979,7 +4957,7 @@
           <a:p>
             <a:pPr algn="ctr"/>
             <a:r>
-              <a:rPr lang="nl-BE" sz="1400" b="1" dirty="0" smtClean="0">
+              <a:rPr lang="nl-BE" sz="1400" b="1" dirty="0">
                 <a:solidFill>
                   <a:schemeClr val="tx1"/>
                 </a:solidFill>
@@ -5004,13 +4982,6 @@
   <p:clrMapOvr>
     <a:masterClrMapping/>
   </p:clrMapOvr>
-  <p:timing>
-    <p:tnLst>
-      <p:par>
-        <p:cTn id="1" dur="indefinite" restart="never" nodeType="tmRoot"/>
-      </p:par>
-    </p:tnLst>
-  </p:timing>
 </p:sld>
 </file>
 
@@ -5075,17 +5046,13 @@
             <a:pPr algn="l"/>
             <a:r>
               <a:rPr lang="nl-BE" dirty="0"/>
-              <a:t>MOOSE creates a _DATABASE object at the start of the mission</a:t>
-            </a:r>
-            <a:r>
-              <a:rPr lang="nl-BE" dirty="0" smtClean="0"/>
-              <a:t>!</a:t>
+              <a:t>MOOSE creates a _DATABASE object at the start of the mission!</a:t>
             </a:r>
           </a:p>
           <a:p>
             <a:pPr algn="l"/>
             <a:r>
-              <a:rPr lang="nl-BE" dirty="0" smtClean="0"/>
+              <a:rPr lang="nl-BE" dirty="0"/>
               <a:t>(The _DATABASE object is an instance of the DATABASE class,</a:t>
             </a:r>
           </a:p>
@@ -5093,11 +5060,7 @@
             <a:pPr algn="l"/>
             <a:r>
               <a:rPr lang="nl-BE" dirty="0"/>
-              <a:t>a</a:t>
-            </a:r>
-            <a:r>
-              <a:rPr lang="nl-BE" dirty="0" smtClean="0"/>
-              <a:t>nd is instantiated automatically in MOOSE_Embedded.lua).</a:t>
+              <a:t>and is instantiated automatically in MOOSE_Embedded.lua).</a:t>
             </a:r>
             <a:endParaRPr lang="en-US" dirty="0"/>
           </a:p>
@@ -5312,13 +5275,6 @@
   <p:clrMapOvr>
     <a:masterClrMapping/>
   </p:clrMapOvr>
-  <p:timing>
-    <p:tnLst>
-      <p:par>
-        <p:cTn id="1" dur="indefinite" restart="never" nodeType="tmRoot"/>
-      </p:par>
-    </p:tnLst>
-  </p:timing>
 </p:sld>
 </file>
 
@@ -6556,7 +6512,7 @@
           <a:lstStyle/>
           <a:p>
             <a:r>
-              <a:rPr lang="nl-BE" sz="2800" dirty="0" smtClean="0">
+              <a:rPr lang="nl-BE" sz="2800" dirty="0">
                 <a:effectLst>
                   <a:outerShdw blurRad="38100" dist="38100" dir="2700000" algn="tl">
                     <a:srgbClr val="000000">
@@ -6570,7 +6526,7 @@
           </a:p>
           <a:p>
             <a:r>
-              <a:rPr lang="nl-BE" sz="2800" dirty="0" smtClean="0">
+              <a:rPr lang="nl-BE" sz="2800" dirty="0">
                 <a:effectLst>
                   <a:outerShdw blurRad="38100" dist="38100" dir="2700000" algn="tl">
                     <a:srgbClr val="000000">
@@ -6603,13 +6559,6 @@
   <p:clrMapOvr>
     <a:masterClrMapping/>
   </p:clrMapOvr>
-  <p:timing>
-    <p:tnLst>
-      <p:par>
-        <p:cTn id="1" dur="indefinite" restart="never" nodeType="tmRoot"/>
-      </p:par>
-    </p:tnLst>
-  </p:timing>
 </p:sld>
 </file>
 
@@ -6680,15 +6629,7 @@
                   <a:schemeClr val="bg1"/>
                 </a:solidFill>
               </a:rPr>
-              <a:t>MISSION DESIGNER </a:t>
-            </a:r>
-            <a:r>
-              <a:rPr lang="nl-BE" b="1" dirty="0" smtClean="0">
-                <a:solidFill>
-                  <a:schemeClr val="bg1"/>
-                </a:solidFill>
-              </a:rPr>
-              <a:t>LUA SCRIPTING</a:t>
+              <a:t>MISSION DESIGNER LUA SCRIPTING</a:t>
             </a:r>
             <a:endParaRPr lang="en-US" b="1" dirty="0">
               <a:solidFill>
@@ -6739,7 +6680,7 @@
           <a:p>
             <a:pPr algn="ctr"/>
             <a:r>
-              <a:rPr lang="nl-BE" b="1" dirty="0" smtClean="0"/>
+              <a:rPr lang="nl-BE" b="1" dirty="0"/>
               <a:t>GROUP WAYPOINTS</a:t>
             </a:r>
             <a:endParaRPr lang="en-US" b="1" dirty="0"/>
@@ -6785,7 +6726,7 @@
           <a:p>
             <a:pPr algn="ctr"/>
             <a:r>
-              <a:rPr lang="nl-BE" b="1" dirty="0" smtClean="0"/>
+              <a:rPr lang="nl-BE" b="1" dirty="0"/>
               <a:t>MOOSE CLASSES</a:t>
             </a:r>
             <a:endParaRPr lang="en-US" b="1" dirty="0"/>
@@ -6833,7 +6774,7 @@
           <a:p>
             <a:pPr algn="ctr"/>
             <a:r>
-              <a:rPr lang="nl-BE" b="1" dirty="0" smtClean="0"/>
+              <a:rPr lang="nl-BE" b="1" dirty="0"/>
               <a:t>MISSION TRIGGERS</a:t>
             </a:r>
             <a:endParaRPr lang="en-US" b="1" dirty="0"/>
@@ -6856,8 +6797,16 @@
           <a:lstStyle/>
           <a:p>
             <a:r>
+              <a:rPr lang="nl-BE" dirty="0" err="1"/>
+              <a:t>Where</a:t>
+            </a:r>
+            <a:r>
               <a:rPr lang="nl-BE" dirty="0"/>
-              <a:t>_database object</a:t>
+              <a:t> _database is </a:t>
+            </a:r>
+            <a:r>
+              <a:rPr lang="nl-BE" dirty="0" err="1"/>
+              <a:t>used</a:t>
             </a:r>
             <a:endParaRPr lang="en-US" dirty="0"/>
           </a:p>
@@ -7609,7 +7558,7 @@
           <a:lstStyle/>
           <a:p>
             <a:r>
-              <a:rPr lang="nl-BE" sz="2800" dirty="0" smtClean="0">
+              <a:rPr lang="nl-BE" sz="2800" dirty="0">
                 <a:effectLst>
                   <a:outerShdw blurRad="38100" dist="38100" dir="2700000" algn="tl">
                     <a:srgbClr val="000000">
@@ -7623,7 +7572,7 @@
           </a:p>
           <a:p>
             <a:r>
-              <a:rPr lang="nl-BE" sz="2800" dirty="0" smtClean="0">
+              <a:rPr lang="nl-BE" sz="2800" dirty="0">
                 <a:effectLst>
                   <a:outerShdw blurRad="38100" dist="38100" dir="2700000" algn="tl">
                     <a:srgbClr val="000000">
@@ -8245,13 +8194,6 @@
   <p:clrMapOvr>
     <a:masterClrMapping/>
   </p:clrMapOvr>
-  <p:timing>
-    <p:tnLst>
-      <p:par>
-        <p:cTn id="1" dur="indefinite" restart="never" nodeType="tmRoot"/>
-      </p:par>
-    </p:tnLst>
-  </p:timing>
 </p:sld>
 </file>
 
@@ -8280,8 +8222,8 @@
         </p:nvSpPr>
         <p:spPr>
           <a:xfrm>
-            <a:off x="4295980" y="2348988"/>
-            <a:ext cx="3240036" cy="4140046"/>
+            <a:off x="4295980" y="2708992"/>
+            <a:ext cx="3240036" cy="3780042"/>
           </a:xfrm>
           <a:prstGeom prst="rect">
             <a:avLst/>
@@ -8313,25 +8255,34 @@
           <a:p>
             <a:pPr algn="ctr"/>
             <a:r>
-              <a:rPr lang="nl-BE" b="1" dirty="0" smtClean="0"/>
-              <a:t>Using the </a:t>
-            </a:r>
-          </a:p>
-          <a:p>
-            <a:pPr algn="ctr"/>
-            <a:r>
-              <a:rPr lang="nl-BE" b="1" dirty="0" smtClean="0"/>
+              <a:rPr lang="nl-BE" b="1" dirty="0">
+                <a:solidFill>
+                  <a:schemeClr val="accent1"/>
+                </a:solidFill>
+              </a:rPr>
               <a:t>_DATABASE:Find</a:t>
             </a:r>
             <a:r>
-              <a:rPr lang="nl-BE" b="1" i="1" dirty="0" smtClean="0"/>
+              <a:rPr lang="nl-BE" b="1" i="1" dirty="0">
+                <a:solidFill>
+                  <a:schemeClr val="accent1"/>
+                </a:solidFill>
+              </a:rPr>
               <a:t>...</a:t>
             </a:r>
             <a:r>
-              <a:rPr lang="nl-BE" b="1" dirty="0" smtClean="0"/>
+              <a:rPr lang="nl-BE" b="1" dirty="0">
+                <a:solidFill>
+                  <a:schemeClr val="accent1"/>
+                </a:solidFill>
+              </a:rPr>
               <a:t>() methods</a:t>
             </a:r>
-            <a:endParaRPr lang="en-US" b="1" dirty="0"/>
+            <a:endParaRPr lang="en-US" b="1" dirty="0">
+              <a:solidFill>
+                <a:schemeClr val="accent1"/>
+              </a:solidFill>
+            </a:endParaRPr>
           </a:p>
         </p:txBody>
       </p:sp>
@@ -8343,8 +8294,8 @@
         </p:nvSpPr>
         <p:spPr>
           <a:xfrm>
-            <a:off x="605939" y="2348988"/>
-            <a:ext cx="3240036" cy="4140046"/>
+            <a:off x="605939" y="2708992"/>
+            <a:ext cx="3240036" cy="3780041"/>
           </a:xfrm>
           <a:prstGeom prst="rect">
             <a:avLst/>
@@ -8376,21 +8327,34 @@
           <a:p>
             <a:pPr algn="ctr"/>
             <a:r>
-              <a:rPr lang="nl-BE" b="1" dirty="0" smtClean="0"/>
-              <a:t>Using the </a:t>
-            </a:r>
-          </a:p>
-          <a:p>
-            <a:pPr algn="ctr"/>
-            <a:r>
-              <a:rPr lang="nl-BE" b="1" i="1" dirty="0" smtClean="0"/>
+              <a:rPr lang="nl-BE" b="1" i="1" dirty="0" err="1">
+                <a:solidFill>
+                  <a:schemeClr val="accent1"/>
+                </a:solidFill>
+              </a:rPr>
               <a:t>CLASS</a:t>
             </a:r>
             <a:r>
-              <a:rPr lang="nl-BE" b="1" dirty="0" smtClean="0"/>
-              <a:t>:Find() method</a:t>
-            </a:r>
-            <a:endParaRPr lang="en-US" b="1" dirty="0"/>
+              <a:rPr lang="nl-BE" b="1" dirty="0" err="1">
+                <a:solidFill>
+                  <a:schemeClr val="accent1"/>
+                </a:solidFill>
+              </a:rPr>
+              <a:t>:Find</a:t>
+            </a:r>
+            <a:r>
+              <a:rPr lang="nl-BE" b="1" dirty="0">
+                <a:solidFill>
+                  <a:schemeClr val="accent1"/>
+                </a:solidFill>
+              </a:rPr>
+              <a:t>() method</a:t>
+            </a:r>
+            <a:endParaRPr lang="en-US" b="1" dirty="0">
+              <a:solidFill>
+                <a:schemeClr val="accent1"/>
+              </a:solidFill>
+            </a:endParaRPr>
           </a:p>
         </p:txBody>
       </p:sp>
@@ -8410,8 +8374,12 @@
           <a:lstStyle/>
           <a:p>
             <a:r>
-              <a:rPr lang="nl-BE" dirty="0" smtClean="0"/>
-              <a:t>REFERENCE MOOSE WRAPPER CLASSES THROUGH _DATABASE OBJECT API</a:t>
+              <a:rPr lang="nl-BE" dirty="0"/>
+              <a:t>How _DATABASE is </a:t>
+            </a:r>
+            <a:r>
+              <a:rPr lang="nl-BE" dirty="0" err="1"/>
+              <a:t>used</a:t>
             </a:r>
             <a:endParaRPr lang="en-US" dirty="0"/>
           </a:p>
@@ -8984,7 +8952,7 @@
           <a:p>
             <a:pPr algn="ctr"/>
             <a:r>
-              <a:rPr lang="nl-BE" dirty="0" smtClean="0">
+              <a:rPr lang="nl-BE" dirty="0">
                 <a:solidFill>
                   <a:schemeClr val="bg1"/>
                 </a:solidFill>
@@ -8995,14 +8963,14 @@
           <a:p>
             <a:pPr algn="ctr"/>
             <a:r>
-              <a:rPr lang="nl-BE" dirty="0" smtClean="0">
+              <a:rPr lang="nl-BE" dirty="0">
                 <a:solidFill>
                   <a:schemeClr val="bg1"/>
                 </a:solidFill>
               </a:rPr>
               <a:t>FindGroup( GroupName )</a:t>
             </a:r>
-            <a:endParaRPr lang="en-US" dirty="0" smtClean="0">
+            <a:endParaRPr lang="en-US" dirty="0">
               <a:solidFill>
                 <a:schemeClr val="bg1"/>
               </a:solidFill>
@@ -9048,7 +9016,7 @@
           <a:p>
             <a:pPr algn="ctr"/>
             <a:r>
-              <a:rPr lang="nl-BE" dirty="0" smtClean="0">
+              <a:rPr lang="nl-BE" dirty="0">
                 <a:solidFill>
                   <a:schemeClr val="bg1"/>
                 </a:solidFill>
@@ -9059,14 +9027,14 @@
           <a:p>
             <a:pPr algn="ctr"/>
             <a:r>
-              <a:rPr lang="nl-BE" dirty="0" smtClean="0">
+              <a:rPr lang="nl-BE" dirty="0">
                 <a:solidFill>
                   <a:schemeClr val="bg1"/>
                 </a:solidFill>
               </a:rPr>
               <a:t>FindUnit( UnitName )</a:t>
             </a:r>
-            <a:endParaRPr lang="en-US" dirty="0" smtClean="0">
+            <a:endParaRPr lang="en-US" dirty="0">
               <a:solidFill>
                 <a:schemeClr val="bg1"/>
               </a:solidFill>
@@ -9112,7 +9080,7 @@
           <a:p>
             <a:pPr algn="ctr"/>
             <a:r>
-              <a:rPr lang="nl-BE" dirty="0" smtClean="0">
+              <a:rPr lang="nl-BE" dirty="0">
                 <a:solidFill>
                   <a:schemeClr val="bg1"/>
                 </a:solidFill>
@@ -9123,14 +9091,14 @@
           <a:p>
             <a:pPr algn="ctr"/>
             <a:r>
-              <a:rPr lang="nl-BE" dirty="0" smtClean="0">
+              <a:rPr lang="nl-BE" dirty="0">
                 <a:solidFill>
                   <a:schemeClr val="bg1"/>
                 </a:solidFill>
               </a:rPr>
               <a:t>FindClient( ClientName )</a:t>
             </a:r>
-            <a:endParaRPr lang="en-US" dirty="0" smtClean="0">
+            <a:endParaRPr lang="en-US" dirty="0">
               <a:solidFill>
                 <a:schemeClr val="bg1"/>
               </a:solidFill>
@@ -9176,7 +9144,7 @@
           <a:p>
             <a:pPr algn="ctr"/>
             <a:r>
-              <a:rPr lang="nl-BE" b="1" dirty="0" smtClean="0">
+              <a:rPr lang="nl-BE" sz="1400" b="1" dirty="0">
                 <a:solidFill>
                   <a:schemeClr val="bg1"/>
                 </a:solidFill>
@@ -9184,14 +9152,57 @@
               <a:t>GROUP</a:t>
             </a:r>
             <a:r>
-              <a:rPr lang="nl-BE" dirty="0" smtClean="0">
+              <a:rPr lang="nl-BE" sz="1400" dirty="0">
                 <a:solidFill>
                   <a:schemeClr val="bg1"/>
                 </a:solidFill>
               </a:rPr>
-              <a:t>:Find( GroupName )</a:t>
-            </a:r>
-            <a:endParaRPr lang="en-US" dirty="0" smtClean="0">
+              <a:t>:Find( DCS Group )</a:t>
+            </a:r>
+          </a:p>
+          <a:p>
+            <a:pPr algn="ctr"/>
+            <a:r>
+              <a:rPr lang="nl-BE" sz="1400" b="1" dirty="0" err="1">
+                <a:solidFill>
+                  <a:schemeClr val="bg1"/>
+                </a:solidFill>
+              </a:rPr>
+              <a:t>GROUP</a:t>
+            </a:r>
+            <a:r>
+              <a:rPr lang="nl-BE" sz="1400" dirty="0" err="1">
+                <a:solidFill>
+                  <a:schemeClr val="bg1"/>
+                </a:solidFill>
+              </a:rPr>
+              <a:t>:FindByName</a:t>
+            </a:r>
+            <a:r>
+              <a:rPr lang="nl-BE" sz="1400" dirty="0">
+                <a:solidFill>
+                  <a:schemeClr val="bg1"/>
+                </a:solidFill>
+              </a:rPr>
+              <a:t>( </a:t>
+            </a:r>
+            <a:r>
+              <a:rPr lang="nl-BE" sz="1400" dirty="0" err="1">
+                <a:solidFill>
+                  <a:schemeClr val="bg1"/>
+                </a:solidFill>
+              </a:rPr>
+              <a:t>GroupName</a:t>
+            </a:r>
+            <a:r>
+              <a:rPr lang="nl-BE" sz="1400" dirty="0">
+                <a:solidFill>
+                  <a:schemeClr val="bg1"/>
+                </a:solidFill>
+              </a:rPr>
+              <a:t> )</a:t>
+            </a:r>
+            <a:endParaRPr lang="en-US" sz="1400" dirty="0">
               <a:solidFill>
                 <a:schemeClr val="bg1"/>
               </a:solidFill>
@@ -9237,7 +9248,7 @@
           <a:p>
             <a:pPr algn="ctr"/>
             <a:r>
-              <a:rPr lang="nl-BE" b="1" dirty="0" smtClean="0">
+              <a:rPr lang="nl-BE" sz="1400" b="1" dirty="0">
                 <a:solidFill>
                   <a:schemeClr val="bg1"/>
                 </a:solidFill>
@@ -9245,75 +9256,164 @@
               <a:t>UNIT</a:t>
             </a:r>
             <a:r>
-              <a:rPr lang="nl-BE" dirty="0" smtClean="0">
+              <a:rPr lang="nl-BE" sz="1400" dirty="0">
                 <a:solidFill>
                   <a:schemeClr val="bg1"/>
                 </a:solidFill>
               </a:rPr>
-              <a:t>:Find( GroupName )</a:t>
-            </a:r>
-            <a:endParaRPr lang="en-US" dirty="0" smtClean="0">
+              <a:t>:Find( DCS Unit )</a:t>
+            </a:r>
+          </a:p>
+          <a:p>
+            <a:pPr algn="ctr"/>
+            <a:r>
+              <a:rPr lang="nl-BE" sz="1400" b="1" dirty="0" err="1">
+                <a:solidFill>
+                  <a:schemeClr val="bg1"/>
+                </a:solidFill>
+              </a:rPr>
+              <a:t>UNIT</a:t>
+            </a:r>
+            <a:r>
+              <a:rPr lang="nl-BE" sz="1400" dirty="0" err="1">
+                <a:solidFill>
+                  <a:schemeClr val="bg1"/>
+                </a:solidFill>
+              </a:rPr>
+              <a:t>:FindByName</a:t>
+            </a:r>
+            <a:r>
+              <a:rPr lang="nl-BE" sz="1400" dirty="0">
+                <a:solidFill>
+                  <a:schemeClr val="bg1"/>
+                </a:solidFill>
+              </a:rPr>
+              <a:t>( </a:t>
+            </a:r>
+            <a:r>
+              <a:rPr lang="nl-BE" sz="1400" dirty="0" err="1">
+                <a:solidFill>
+                  <a:schemeClr val="bg1"/>
+                </a:solidFill>
+              </a:rPr>
+              <a:t>UnitName</a:t>
+            </a:r>
+            <a:r>
+              <a:rPr lang="nl-BE" sz="1400" dirty="0">
+                <a:solidFill>
+                  <a:schemeClr val="bg1"/>
+                </a:solidFill>
+              </a:rPr>
+              <a:t> )</a:t>
+            </a:r>
+          </a:p>
+        </p:txBody>
+      </p:sp>
+      <p:sp>
+        <p:nvSpPr>
+          <p:cNvPr id="21" name="TextBox 20"/>
+          <p:cNvSpPr txBox="1"/>
+          <p:nvPr/>
+        </p:nvSpPr>
+        <p:spPr>
+          <a:xfrm>
+            <a:off x="695940" y="4959017"/>
+            <a:ext cx="3060034" cy="720008"/>
+          </a:xfrm>
+          <a:prstGeom prst="roundRect">
+            <a:avLst/>
+          </a:prstGeom>
+          <a:ln w="28575"/>
+        </p:spPr>
+        <p:style>
+          <a:lnRef idx="2">
+            <a:schemeClr val="accent1"/>
+          </a:lnRef>
+          <a:fillRef idx="1">
+            <a:schemeClr val="lt1"/>
+          </a:fillRef>
+          <a:effectRef idx="0">
+            <a:schemeClr val="accent1"/>
+          </a:effectRef>
+          <a:fontRef idx="minor">
+            <a:schemeClr val="dk1"/>
+          </a:fontRef>
+        </p:style>
+        <p:txBody>
+          <a:bodyPr wrap="square" rtlCol="0">
+            <a:noAutofit/>
+          </a:bodyPr>
+          <a:lstStyle/>
+          <a:p>
+            <a:pPr algn="ctr"/>
+            <a:r>
+              <a:rPr lang="nl-BE" sz="1400" b="1" dirty="0">
+                <a:solidFill>
+                  <a:schemeClr val="bg1"/>
+                </a:solidFill>
+              </a:rPr>
+              <a:t>CLIENT</a:t>
+            </a:r>
+            <a:r>
+              <a:rPr lang="nl-BE" sz="1400" dirty="0">
+                <a:solidFill>
+                  <a:schemeClr val="bg1"/>
+                </a:solidFill>
+              </a:rPr>
+              <a:t>:Find( DCS Unit )</a:t>
+            </a:r>
+          </a:p>
+          <a:p>
+            <a:pPr algn="ctr"/>
+            <a:r>
+              <a:rPr lang="nl-BE" sz="1400" b="1" dirty="0" err="1">
+                <a:solidFill>
+                  <a:schemeClr val="bg1"/>
+                </a:solidFill>
+              </a:rPr>
+              <a:t>CLIENT</a:t>
+            </a:r>
+            <a:r>
+              <a:rPr lang="nl-BE" sz="1400" dirty="0" err="1">
+                <a:solidFill>
+                  <a:schemeClr val="bg1"/>
+                </a:solidFill>
+              </a:rPr>
+              <a:t>:FindByName</a:t>
+            </a:r>
+            <a:r>
+              <a:rPr lang="nl-BE" sz="1400" dirty="0">
+                <a:solidFill>
+                  <a:schemeClr val="bg1"/>
+                </a:solidFill>
+              </a:rPr>
+              <a:t>( </a:t>
+            </a:r>
+            <a:r>
+              <a:rPr lang="nl-BE" sz="1400" dirty="0" err="1">
+                <a:solidFill>
+                  <a:schemeClr val="bg1"/>
+                </a:solidFill>
+              </a:rPr>
+              <a:t>UnitName</a:t>
+            </a:r>
+            <a:r>
+              <a:rPr lang="nl-BE" sz="1400" dirty="0">
+                <a:solidFill>
+                  <a:schemeClr val="bg1"/>
+                </a:solidFill>
+              </a:rPr>
+              <a:t> )</a:t>
+            </a:r>
+            <a:endParaRPr lang="en-US" sz="1400" dirty="0">
               <a:solidFill>
                 <a:schemeClr val="bg1"/>
               </a:solidFill>
             </a:endParaRPr>
           </a:p>
-        </p:txBody>
-      </p:sp>
-      <p:sp>
-        <p:nvSpPr>
-          <p:cNvPr id="21" name="TextBox 20"/>
-          <p:cNvSpPr txBox="1"/>
-          <p:nvPr/>
-        </p:nvSpPr>
-        <p:spPr>
-          <a:xfrm>
-            <a:off x="695940" y="4959017"/>
-            <a:ext cx="3060034" cy="720008"/>
-          </a:xfrm>
-          <a:prstGeom prst="roundRect">
-            <a:avLst/>
-          </a:prstGeom>
-          <a:ln w="28575"/>
-        </p:spPr>
-        <p:style>
-          <a:lnRef idx="2">
-            <a:schemeClr val="accent1"/>
-          </a:lnRef>
-          <a:fillRef idx="1">
-            <a:schemeClr val="lt1"/>
-          </a:fillRef>
-          <a:effectRef idx="0">
-            <a:schemeClr val="accent1"/>
-          </a:effectRef>
-          <a:fontRef idx="minor">
-            <a:schemeClr val="dk1"/>
-          </a:fontRef>
-        </p:style>
-        <p:txBody>
-          <a:bodyPr wrap="square" rtlCol="0">
-            <a:noAutofit/>
-          </a:bodyPr>
-          <a:lstStyle/>
           <a:p>
             <a:pPr algn="ctr"/>
-            <a:r>
-              <a:rPr lang="nl-BE" b="1" dirty="0" smtClean="0">
-                <a:solidFill>
-                  <a:schemeClr val="bg1"/>
-                </a:solidFill>
-              </a:rPr>
-              <a:t>CLIENT</a:t>
-            </a:r>
-            <a:r>
-              <a:rPr lang="nl-BE" dirty="0" smtClean="0">
-                <a:solidFill>
-                  <a:schemeClr val="bg1"/>
-                </a:solidFill>
-              </a:rPr>
-              <a:t>:Find( GroupName )</a:t>
-            </a:r>
-            <a:endParaRPr lang="en-US" dirty="0" smtClean="0">
+            <a:endParaRPr lang="en-US" dirty="0">
               <a:solidFill>
                 <a:schemeClr val="bg1"/>
               </a:solidFill>
@@ -9776,14 +9876,14 @@
           <a:p>
             <a:pPr algn="ctr"/>
             <a:r>
-              <a:rPr lang="nl-BE" sz="1100" dirty="0" smtClean="0">
+              <a:rPr lang="nl-BE" sz="1100" dirty="0">
                 <a:solidFill>
                   <a:schemeClr val="bg1"/>
                 </a:solidFill>
               </a:rPr>
               <a:t>The CLASS:Find( DCSObject) will search for the MOOSE wrapper class within the _DATABASE, using the _DATABASE:Find...() methods.</a:t>
             </a:r>
-            <a:endParaRPr lang="en-US" sz="1100" dirty="0" smtClean="0">
+            <a:endParaRPr lang="en-US" sz="1100" dirty="0">
               <a:solidFill>
                 <a:schemeClr val="bg1"/>
               </a:solidFill>
@@ -9831,17 +9931,55 @@
           <a:p>
             <a:pPr algn="ctr"/>
             <a:r>
-              <a:rPr lang="nl-BE" sz="1100" dirty="0" smtClean="0">
+              <a:rPr lang="nl-BE" sz="1100" dirty="0">
                 <a:solidFill>
                   <a:schemeClr val="bg1"/>
                 </a:solidFill>
               </a:rPr>
               <a:t>The _DATABASE:Find...() will search within the _DATABASE for the relevant wrapper object, and will return the pointer to that object.</a:t>
             </a:r>
-            <a:endParaRPr lang="en-US" sz="1100" dirty="0" smtClean="0">
+            <a:endParaRPr lang="en-US" sz="1100" dirty="0">
               <a:solidFill>
                 <a:schemeClr val="bg1"/>
               </a:solidFill>
+            </a:endParaRPr>
+          </a:p>
+        </p:txBody>
+      </p:sp>
+      <p:sp>
+        <p:nvSpPr>
+          <p:cNvPr id="38" name="Tekstvak 4"/>
+          <p:cNvSpPr txBox="1"/>
+          <p:nvPr/>
+        </p:nvSpPr>
+        <p:spPr>
+          <a:xfrm>
+            <a:off x="335936" y="1898983"/>
+            <a:ext cx="4770053" cy="450005"/>
+          </a:xfrm>
+          <a:prstGeom prst="rect">
+            <a:avLst/>
+          </a:prstGeom>
+          <a:noFill/>
+        </p:spPr>
+        <p:txBody>
+          <a:bodyPr wrap="none" rtlCol="0">
+            <a:noAutofit/>
+          </a:bodyPr>
+          <a:lstStyle/>
+          <a:p>
+            <a:r>
+              <a:rPr lang="nl-BE" sz="2800" dirty="0"/>
+              <a:t>REFERENCE MOOSE WRAPPER CLASSES THROUGH _DATABASE OBJECT API</a:t>
+            </a:r>
+            <a:endParaRPr lang="en-US" sz="2800" dirty="0">
+              <a:effectLst>
+                <a:outerShdw blurRad="38100" dist="38100" dir="2700000" algn="tl">
+                  <a:srgbClr val="000000">
+                    <a:alpha val="43137"/>
+                  </a:srgbClr>
+                </a:outerShdw>
+              </a:effectLst>
             </a:endParaRPr>
           </a:p>
         </p:txBody>
@@ -9856,13 +9994,6 @@
   <p:clrMapOvr>
     <a:masterClrMapping/>
   </p:clrMapOvr>
-  <p:timing>
-    <p:tnLst>
-      <p:par>
-        <p:cTn id="1" dur="indefinite" restart="never" nodeType="tmRoot"/>
-      </p:par>
-    </p:tnLst>
-  </p:timing>
 </p:sld>
 </file>
 
@@ -9900,11 +10031,31 @@
           <a:p>
             <a:r>
               <a:rPr lang="nl-BE" dirty="0"/>
-              <a:t>PART </a:t>
-            </a:r>
-            <a:r>
-              <a:rPr lang="nl-BE" dirty="0" smtClean="0"/>
-              <a:t>3: moose core classes</a:t>
+              <a:t>PART 3: </a:t>
+            </a:r>
+            <a:r>
+              <a:rPr lang="nl-BE" dirty="0" err="1"/>
+              <a:t>moose</a:t>
+            </a:r>
+            <a:r>
+              <a:rPr lang="nl-BE" dirty="0"/>
+              <a:t> base, unit, </a:t>
+            </a:r>
+            <a:r>
+              <a:rPr lang="nl-BE" dirty="0" err="1"/>
+              <a:t>client</a:t>
+            </a:r>
+            <a:r>
+              <a:rPr lang="nl-BE" dirty="0"/>
+              <a:t>, </a:t>
+            </a:r>
+            <a:r>
+              <a:rPr lang="nl-BE" dirty="0" err="1"/>
+              <a:t>group</a:t>
+            </a:r>
+            <a:r>
+              <a:rPr lang="nl-BE" dirty="0"/>
+              <a:t>, database classes</a:t>
             </a:r>
             <a:endParaRPr lang="en-US" dirty="0"/>
           </a:p>
@@ -9912,82 +10063,1084 @@
       </p:sp>
       <p:sp>
         <p:nvSpPr>
-          <p:cNvPr id="7" name="Tijdelijke aanduiding voor inhoud 6"/>
-          <p:cNvSpPr>
-            <a:spLocks noGrp="1"/>
-          </p:cNvSpPr>
-          <p:nvPr>
-            <p:ph idx="1"/>
-          </p:nvPr>
-        </p:nvSpPr>
-        <p:spPr/>
-        <p:txBody>
-          <a:bodyPr>
-            <a:normAutofit lnSpcReduction="10000"/>
-          </a:bodyPr>
-          <a:lstStyle/>
-          <a:p>
-            <a:r>
-              <a:rPr lang="nl-BE" dirty="0" smtClean="0"/>
-              <a:t>The DCS class hierarchy</a:t>
-            </a:r>
-          </a:p>
-          <a:p>
-            <a:r>
-              <a:rPr lang="nl-BE" dirty="0" smtClean="0"/>
-              <a:t>The classes</a:t>
-            </a:r>
-            <a:r>
-              <a:rPr lang="en-US" dirty="0"/>
+          <p:cNvPr id="11" name="Rechthoek 10"/>
+          <p:cNvSpPr/>
+          <p:nvPr/>
+        </p:nvSpPr>
+        <p:spPr>
+          <a:xfrm>
+            <a:off x="6546005" y="2708992"/>
+            <a:ext cx="5040056" cy="3960044"/>
+          </a:xfrm>
+          <a:prstGeom prst="rect">
+            <a:avLst/>
+          </a:prstGeom>
+          <a:solidFill>
+            <a:schemeClr val="tx1"/>
+          </a:solidFill>
+          <a:ln w="28575"/>
+        </p:spPr>
+        <p:style>
+          <a:lnRef idx="2">
+            <a:schemeClr val="accent1"/>
+          </a:lnRef>
+          <a:fillRef idx="1">
+            <a:schemeClr val="lt1"/>
+          </a:fillRef>
+          <a:effectRef idx="0">
+            <a:schemeClr val="accent1"/>
+          </a:effectRef>
+          <a:fontRef idx="minor">
+            <a:schemeClr val="dk1"/>
+          </a:fontRef>
+        </p:style>
+        <p:txBody>
+          <a:bodyPr rtlCol="0" anchor="t"/>
+          <a:lstStyle/>
+          <a:p>
+            <a:pPr marL="342900" indent="-342900">
+              <a:buFont typeface="Arial" panose="020B0604020202020204" pitchFamily="34" charset="0"/>
+              <a:buChar char="•"/>
+            </a:pPr>
+            <a:r>
+              <a:rPr lang="nl-BE" dirty="0"/>
+              <a:t>Make </a:t>
+            </a:r>
+            <a:r>
+              <a:rPr lang="nl-BE" dirty="0" err="1"/>
+              <a:t>lua</a:t>
+            </a:r>
+            <a:r>
+              <a:rPr lang="nl-BE" dirty="0"/>
               <a:t> </a:t>
             </a:r>
             <a:r>
-              <a:rPr lang="en-US" dirty="0" smtClean="0"/>
-              <a:t>BASE, GROUP, UNIT, CLIENT</a:t>
-            </a:r>
-          </a:p>
-          <a:p>
-            <a:r>
-              <a:rPr lang="nl-BE" dirty="0" smtClean="0"/>
-              <a:t>MOOSE class hierarch (mechanism)</a:t>
-            </a:r>
-          </a:p>
-          <a:p>
-            <a:r>
-              <a:rPr lang="nl-BE" dirty="0" smtClean="0"/>
-              <a:t>DCS object wrapping</a:t>
-            </a:r>
-          </a:p>
-          <a:p>
-            <a:r>
-              <a:rPr lang="nl-BE" dirty="0" smtClean="0"/>
-              <a:t>DATABASE class</a:t>
-            </a:r>
-          </a:p>
-          <a:p>
-            <a:r>
-              <a:rPr lang="nl-BE" dirty="0" smtClean="0"/>
-              <a:t>_DATABASE object</a:t>
-            </a:r>
-          </a:p>
-          <a:p>
-            <a:r>
-              <a:rPr lang="nl-BE" dirty="0" smtClean="0"/>
-              <a:t>Where _DATABASE is used</a:t>
-            </a:r>
-          </a:p>
-          <a:p>
-            <a:r>
-              <a:rPr lang="nl-BE" dirty="0" smtClean="0"/>
-              <a:t>How _DATABASE is used</a:t>
-            </a:r>
-          </a:p>
-          <a:p>
-            <a:r>
-              <a:rPr lang="nl-BE" dirty="0" smtClean="0"/>
-              <a:t>SETS</a:t>
-            </a:r>
+              <a:rPr lang="nl-BE" dirty="0" err="1"/>
+              <a:t>scripting</a:t>
+            </a:r>
+            <a:r>
+              <a:rPr lang="nl-BE" dirty="0"/>
+              <a:t> </a:t>
+            </a:r>
+            <a:r>
+              <a:rPr lang="nl-BE" b="1" dirty="0"/>
+              <a:t>more easy </a:t>
+            </a:r>
+            <a:r>
+              <a:rPr lang="nl-BE" dirty="0" err="1"/>
+              <a:t>for</a:t>
+            </a:r>
+            <a:r>
+              <a:rPr lang="nl-BE" dirty="0"/>
+              <a:t> mission designers, </a:t>
+            </a:r>
+            <a:r>
+              <a:rPr lang="nl-BE" dirty="0" err="1"/>
+              <a:t>provide</a:t>
+            </a:r>
+            <a:r>
+              <a:rPr lang="nl-BE" dirty="0"/>
+              <a:t> </a:t>
+            </a:r>
+            <a:r>
+              <a:rPr lang="nl-BE" dirty="0" err="1"/>
+              <a:t>an</a:t>
+            </a:r>
+            <a:r>
+              <a:rPr lang="nl-BE" dirty="0"/>
+              <a:t> </a:t>
+            </a:r>
+            <a:r>
+              <a:rPr lang="nl-BE" dirty="0" err="1"/>
+              <a:t>abstraction</a:t>
+            </a:r>
+            <a:r>
+              <a:rPr lang="nl-BE" dirty="0"/>
+              <a:t> </a:t>
+            </a:r>
+            <a:r>
+              <a:rPr lang="nl-BE" dirty="0" err="1"/>
+              <a:t>layer</a:t>
+            </a:r>
+            <a:r>
+              <a:rPr lang="nl-BE" dirty="0"/>
+              <a:t>.</a:t>
+            </a:r>
+          </a:p>
+          <a:p>
+            <a:pPr marL="342900" indent="-342900">
+              <a:buFont typeface="Arial" panose="020B0604020202020204" pitchFamily="34" charset="0"/>
+              <a:buChar char="•"/>
+            </a:pPr>
+            <a:r>
+              <a:rPr lang="nl-BE" dirty="0" err="1"/>
+              <a:t>Achieve</a:t>
+            </a:r>
+            <a:r>
+              <a:rPr lang="nl-BE" b="1" dirty="0"/>
+              <a:t> more </a:t>
+            </a:r>
+            <a:r>
+              <a:rPr lang="nl-BE" dirty="0" err="1"/>
+              <a:t>with</a:t>
+            </a:r>
+            <a:r>
+              <a:rPr lang="nl-BE" dirty="0"/>
+              <a:t> </a:t>
+            </a:r>
+            <a:r>
+              <a:rPr lang="nl-BE" b="1" dirty="0" err="1"/>
+              <a:t>less</a:t>
+            </a:r>
+            <a:r>
+              <a:rPr lang="nl-BE" dirty="0"/>
+              <a:t> </a:t>
+            </a:r>
+            <a:r>
+              <a:rPr lang="nl-BE" dirty="0" err="1"/>
+              <a:t>lua</a:t>
+            </a:r>
+            <a:r>
+              <a:rPr lang="nl-BE" dirty="0"/>
+              <a:t> code.</a:t>
+            </a:r>
+          </a:p>
+          <a:p>
+            <a:pPr marL="342900" indent="-342900">
+              <a:buFont typeface="Arial" panose="020B0604020202020204" pitchFamily="34" charset="0"/>
+              <a:buChar char="•"/>
+            </a:pPr>
+            <a:r>
+              <a:rPr lang="nl-BE" dirty="0" err="1"/>
+              <a:t>Allow</a:t>
+            </a:r>
+            <a:r>
+              <a:rPr lang="nl-BE" dirty="0"/>
+              <a:t> </a:t>
+            </a:r>
+            <a:r>
+              <a:rPr lang="nl-BE" dirty="0" err="1"/>
+              <a:t>to</a:t>
+            </a:r>
+            <a:r>
+              <a:rPr lang="nl-BE" dirty="0"/>
+              <a:t> </a:t>
+            </a:r>
+            <a:r>
+              <a:rPr lang="nl-BE" b="1" dirty="0" err="1"/>
+              <a:t>condense</a:t>
+            </a:r>
+            <a:r>
+              <a:rPr lang="nl-BE" b="1" dirty="0"/>
+              <a:t> code </a:t>
+            </a:r>
+            <a:r>
+              <a:rPr lang="nl-BE" dirty="0" err="1"/>
+              <a:t>within</a:t>
+            </a:r>
+            <a:r>
+              <a:rPr lang="nl-BE" dirty="0"/>
+              <a:t> </a:t>
+            </a:r>
+            <a:r>
+              <a:rPr lang="nl-BE" dirty="0" err="1"/>
+              <a:t>one</a:t>
+            </a:r>
+            <a:r>
+              <a:rPr lang="nl-BE" dirty="0"/>
+              <a:t> script file.</a:t>
+            </a:r>
+          </a:p>
+          <a:p>
+            <a:pPr marL="342900" indent="-342900">
+              <a:buFont typeface="Arial" panose="020B0604020202020204" pitchFamily="34" charset="0"/>
+              <a:buChar char="•"/>
+            </a:pPr>
+            <a:r>
+              <a:rPr lang="nl-BE" dirty="0"/>
+              <a:t>Proper </a:t>
+            </a:r>
+            <a:r>
+              <a:rPr lang="nl-BE" b="1" dirty="0" err="1"/>
+              <a:t>documentation</a:t>
+            </a:r>
+            <a:r>
+              <a:rPr lang="nl-BE" dirty="0"/>
+              <a:t>.</a:t>
+            </a:r>
+          </a:p>
+          <a:p>
+            <a:pPr marL="342900" indent="-342900">
+              <a:buFont typeface="Arial" panose="020B0604020202020204" pitchFamily="34" charset="0"/>
+              <a:buChar char="•"/>
+            </a:pPr>
+            <a:r>
+              <a:rPr lang="nl-BE" b="1" dirty="0" err="1"/>
+              <a:t>Example</a:t>
+            </a:r>
+            <a:r>
+              <a:rPr lang="nl-BE" b="1" dirty="0"/>
+              <a:t> </a:t>
+            </a:r>
+            <a:r>
+              <a:rPr lang="nl-BE" b="1" dirty="0" err="1"/>
+              <a:t>missions</a:t>
+            </a:r>
+            <a:r>
+              <a:rPr lang="nl-BE" dirty="0"/>
+              <a:t>.</a:t>
+            </a:r>
+          </a:p>
+          <a:p>
+            <a:pPr marL="342900" indent="-342900">
+              <a:buFont typeface="Arial" panose="020B0604020202020204" pitchFamily="34" charset="0"/>
+              <a:buChar char="•"/>
+            </a:pPr>
+            <a:r>
+              <a:rPr lang="nl-BE" dirty="0" err="1"/>
+              <a:t>Work</a:t>
+            </a:r>
+            <a:r>
+              <a:rPr lang="nl-BE" dirty="0"/>
+              <a:t> </a:t>
+            </a:r>
+            <a:r>
+              <a:rPr lang="nl-BE" dirty="0" err="1"/>
+              <a:t>with</a:t>
+            </a:r>
+            <a:r>
+              <a:rPr lang="nl-BE" dirty="0"/>
+              <a:t> (</a:t>
+            </a:r>
+            <a:r>
+              <a:rPr lang="nl-BE" dirty="0" err="1"/>
+              <a:t>global</a:t>
+            </a:r>
+            <a:r>
+              <a:rPr lang="nl-BE" dirty="0"/>
+              <a:t>) </a:t>
+            </a:r>
+            <a:r>
+              <a:rPr lang="nl-BE" b="1" dirty="0" err="1"/>
+              <a:t>objects</a:t>
+            </a:r>
+            <a:r>
+              <a:rPr lang="nl-BE" dirty="0"/>
+              <a:t> </a:t>
+            </a:r>
+            <a:r>
+              <a:rPr lang="nl-BE" dirty="0" err="1"/>
+              <a:t>with</a:t>
+            </a:r>
+            <a:r>
+              <a:rPr lang="nl-BE" dirty="0"/>
+              <a:t> </a:t>
+            </a:r>
+            <a:r>
+              <a:rPr lang="nl-BE" dirty="0" err="1"/>
+              <a:t>methods</a:t>
+            </a:r>
+            <a:r>
+              <a:rPr lang="nl-BE" dirty="0"/>
+              <a:t>.</a:t>
+            </a:r>
+          </a:p>
+          <a:p>
+            <a:pPr marL="342900" indent="-342900">
+              <a:buFont typeface="Arial" panose="020B0604020202020204" pitchFamily="34" charset="0"/>
+              <a:buChar char="•"/>
+            </a:pPr>
+            <a:r>
+              <a:rPr lang="nl-BE" b="1" dirty="0" err="1"/>
+              <a:t>Polymorphism</a:t>
+            </a:r>
+            <a:r>
+              <a:rPr lang="nl-BE" dirty="0"/>
+              <a:t>.</a:t>
+            </a:r>
+          </a:p>
+          <a:p>
+            <a:pPr marL="342900" indent="-342900">
+              <a:buFont typeface="Arial" panose="020B0604020202020204" pitchFamily="34" charset="0"/>
+              <a:buChar char="•"/>
+            </a:pPr>
+            <a:r>
+              <a:rPr lang="nl-BE" dirty="0" err="1"/>
+              <a:t>Create</a:t>
+            </a:r>
+            <a:r>
+              <a:rPr lang="nl-BE" dirty="0"/>
+              <a:t> </a:t>
+            </a:r>
+            <a:r>
+              <a:rPr lang="nl-BE" b="1" dirty="0"/>
+              <a:t>multiple </a:t>
+            </a:r>
+            <a:r>
+              <a:rPr lang="nl-BE" b="1" dirty="0" err="1"/>
+              <a:t>tasks</a:t>
+            </a:r>
+            <a:r>
+              <a:rPr lang="nl-BE" b="1" dirty="0"/>
+              <a:t> (goals) </a:t>
+            </a:r>
+            <a:r>
+              <a:rPr lang="nl-BE" dirty="0" err="1"/>
+              <a:t>within</a:t>
+            </a:r>
+            <a:r>
+              <a:rPr lang="nl-BE" dirty="0"/>
+              <a:t> </a:t>
+            </a:r>
+            <a:r>
+              <a:rPr lang="nl-BE" dirty="0" err="1"/>
+              <a:t>one</a:t>
+            </a:r>
+            <a:r>
+              <a:rPr lang="nl-BE" dirty="0"/>
+              <a:t> mission.</a:t>
+            </a:r>
+          </a:p>
+          <a:p>
+            <a:pPr marL="342900" indent="-342900">
+              <a:buFont typeface="Arial" panose="020B0604020202020204" pitchFamily="34" charset="0"/>
+              <a:buChar char="•"/>
+            </a:pPr>
+            <a:r>
+              <a:rPr lang="nl-BE" b="1" dirty="0" err="1"/>
+              <a:t>Avoid</a:t>
+            </a:r>
+            <a:r>
+              <a:rPr lang="nl-BE" dirty="0"/>
+              <a:t> large </a:t>
+            </a:r>
+            <a:r>
+              <a:rPr lang="nl-BE" b="1" dirty="0" err="1"/>
+              <a:t>repeating</a:t>
+            </a:r>
+            <a:r>
+              <a:rPr lang="nl-BE" b="1" dirty="0"/>
+              <a:t> loops</a:t>
+            </a:r>
+            <a:r>
+              <a:rPr lang="nl-BE" dirty="0"/>
+              <a:t>. Follow </a:t>
+            </a:r>
+            <a:r>
+              <a:rPr lang="nl-BE" dirty="0" err="1"/>
+              <a:t>the</a:t>
+            </a:r>
+            <a:r>
+              <a:rPr lang="nl-BE" dirty="0"/>
+              <a:t> DCS event system </a:t>
+            </a:r>
+            <a:r>
+              <a:rPr lang="nl-BE" dirty="0" err="1"/>
+              <a:t>and</a:t>
+            </a:r>
+            <a:r>
+              <a:rPr lang="nl-BE" dirty="0"/>
+              <a:t> </a:t>
+            </a:r>
+            <a:r>
+              <a:rPr lang="nl-BE" dirty="0" err="1"/>
+              <a:t>react</a:t>
+            </a:r>
+            <a:r>
+              <a:rPr lang="nl-BE" dirty="0"/>
+              <a:t> </a:t>
+            </a:r>
+            <a:r>
+              <a:rPr lang="nl-BE" dirty="0" err="1"/>
+              <a:t>upon</a:t>
+            </a:r>
+            <a:r>
+              <a:rPr lang="nl-BE" dirty="0"/>
+              <a:t> </a:t>
+            </a:r>
+            <a:r>
+              <a:rPr lang="nl-BE" dirty="0" err="1"/>
+              <a:t>it</a:t>
+            </a:r>
+            <a:r>
+              <a:rPr lang="nl-BE" dirty="0"/>
+              <a:t>, </a:t>
+            </a:r>
+            <a:r>
+              <a:rPr lang="nl-BE" dirty="0" err="1"/>
+              <a:t>improving</a:t>
+            </a:r>
+            <a:r>
+              <a:rPr lang="nl-BE" dirty="0"/>
+              <a:t> performance.</a:t>
+            </a:r>
+          </a:p>
+          <a:p>
+            <a:pPr marL="342900" indent="-342900">
+              <a:buFont typeface="Arial" panose="020B0604020202020204" pitchFamily="34" charset="0"/>
+              <a:buChar char="•"/>
+            </a:pPr>
+            <a:r>
+              <a:rPr lang="nl-BE" dirty="0" err="1"/>
+              <a:t>Provide</a:t>
+            </a:r>
+            <a:r>
+              <a:rPr lang="nl-BE" dirty="0"/>
+              <a:t> </a:t>
+            </a:r>
+            <a:r>
+              <a:rPr lang="nl-BE" dirty="0" err="1"/>
+              <a:t>an</a:t>
+            </a:r>
+            <a:r>
+              <a:rPr lang="nl-BE" dirty="0"/>
+              <a:t> </a:t>
+            </a:r>
+            <a:r>
+              <a:rPr lang="nl-BE" b="1" dirty="0"/>
+              <a:t>off-</a:t>
+            </a:r>
+            <a:r>
+              <a:rPr lang="nl-BE" b="1" dirty="0" err="1"/>
+              <a:t>the</a:t>
+            </a:r>
+            <a:r>
+              <a:rPr lang="nl-BE" b="1" dirty="0"/>
+              <a:t>-</a:t>
+            </a:r>
+            <a:r>
+              <a:rPr lang="nl-BE" b="1" dirty="0" err="1"/>
+              <a:t>shelf</a:t>
+            </a:r>
+            <a:r>
+              <a:rPr lang="nl-BE" b="1" dirty="0"/>
+              <a:t> </a:t>
+            </a:r>
+            <a:r>
+              <a:rPr lang="nl-BE" b="1" dirty="0" err="1"/>
+              <a:t>logging</a:t>
+            </a:r>
+            <a:r>
+              <a:rPr lang="nl-BE" b="1" dirty="0"/>
+              <a:t> system</a:t>
+            </a:r>
+            <a:r>
+              <a:rPr lang="nl-BE" dirty="0"/>
+              <a:t>.</a:t>
+            </a:r>
+          </a:p>
+        </p:txBody>
+      </p:sp>
+      <p:sp>
+        <p:nvSpPr>
+          <p:cNvPr id="12" name="Rechthoek 11"/>
+          <p:cNvSpPr/>
+          <p:nvPr/>
+        </p:nvSpPr>
+        <p:spPr>
+          <a:xfrm>
+            <a:off x="605940" y="2708992"/>
+            <a:ext cx="5040055" cy="3960044"/>
+          </a:xfrm>
+          <a:prstGeom prst="rect">
+            <a:avLst/>
+          </a:prstGeom>
+          <a:solidFill>
+            <a:schemeClr val="tx2">
+              <a:lumMod val="90000"/>
+            </a:schemeClr>
+          </a:solidFill>
+          <a:ln w="28575"/>
+        </p:spPr>
+        <p:style>
+          <a:lnRef idx="2">
+            <a:schemeClr val="accent1"/>
+          </a:lnRef>
+          <a:fillRef idx="1">
+            <a:schemeClr val="lt1"/>
+          </a:fillRef>
+          <a:effectRef idx="0">
+            <a:schemeClr val="accent1"/>
+          </a:effectRef>
+          <a:fontRef idx="minor">
+            <a:schemeClr val="dk1"/>
+          </a:fontRef>
+        </p:style>
+        <p:txBody>
+          <a:bodyPr rtlCol="0" anchor="t"/>
+          <a:lstStyle/>
+          <a:p>
+            <a:pPr marL="342900" indent="-342900">
+              <a:buFont typeface="Arial" panose="020B0604020202020204" pitchFamily="34" charset="0"/>
+              <a:buChar char="•"/>
+            </a:pPr>
+            <a:r>
+              <a:rPr lang="nl-BE" dirty="0"/>
+              <a:t>Huge </a:t>
+            </a:r>
+            <a:r>
+              <a:rPr lang="nl-BE" dirty="0" err="1"/>
+              <a:t>learning</a:t>
+            </a:r>
+            <a:r>
+              <a:rPr lang="nl-BE" dirty="0"/>
+              <a:t> curve </a:t>
+            </a:r>
+            <a:r>
+              <a:rPr lang="nl-BE" dirty="0" err="1"/>
+              <a:t>learning</a:t>
+            </a:r>
+            <a:r>
+              <a:rPr lang="nl-BE" dirty="0"/>
+              <a:t> </a:t>
+            </a:r>
+            <a:r>
+              <a:rPr lang="nl-BE" dirty="0" err="1"/>
+              <a:t>the</a:t>
+            </a:r>
+            <a:r>
+              <a:rPr lang="nl-BE" dirty="0"/>
+              <a:t> DCS </a:t>
+            </a:r>
+            <a:r>
+              <a:rPr lang="nl-BE" dirty="0" err="1"/>
+              <a:t>scripting</a:t>
+            </a:r>
+            <a:r>
+              <a:rPr lang="nl-BE" dirty="0"/>
+              <a:t> engine </a:t>
+            </a:r>
+            <a:r>
+              <a:rPr lang="nl-BE" dirty="0" err="1"/>
+              <a:t>APIs</a:t>
+            </a:r>
+            <a:r>
+              <a:rPr lang="nl-BE" dirty="0"/>
+              <a:t> .</a:t>
+            </a:r>
+          </a:p>
+          <a:p>
+            <a:pPr marL="342900" indent="-342900">
+              <a:buFont typeface="Arial" panose="020B0604020202020204" pitchFamily="34" charset="0"/>
+              <a:buChar char="•"/>
+            </a:pPr>
+            <a:r>
+              <a:rPr lang="nl-BE" dirty="0"/>
+              <a:t>Lots of well </a:t>
+            </a:r>
+            <a:r>
+              <a:rPr lang="nl-BE" dirty="0" err="1"/>
+              <a:t>written</a:t>
+            </a:r>
+            <a:r>
+              <a:rPr lang="nl-BE" dirty="0"/>
+              <a:t> scripts </a:t>
+            </a:r>
+            <a:r>
+              <a:rPr lang="nl-BE" dirty="0" err="1"/>
+              <a:t>from</a:t>
+            </a:r>
+            <a:r>
+              <a:rPr lang="nl-BE" dirty="0"/>
+              <a:t> </a:t>
+            </a:r>
+            <a:r>
+              <a:rPr lang="nl-BE" dirty="0" err="1"/>
+              <a:t>the</a:t>
+            </a:r>
+            <a:r>
+              <a:rPr lang="nl-BE" dirty="0"/>
+              <a:t> community, but hard </a:t>
+            </a:r>
+            <a:r>
+              <a:rPr lang="nl-BE" dirty="0" err="1"/>
+              <a:t>to</a:t>
+            </a:r>
+            <a:r>
+              <a:rPr lang="nl-BE" dirty="0"/>
+              <a:t> combine in </a:t>
+            </a:r>
+            <a:r>
+              <a:rPr lang="nl-BE" dirty="0" err="1"/>
+              <a:t>scenarios</a:t>
+            </a:r>
+            <a:r>
+              <a:rPr lang="nl-BE" dirty="0"/>
+              <a:t>, </a:t>
+            </a:r>
+            <a:r>
+              <a:rPr lang="nl-BE" dirty="0" err="1"/>
+              <a:t>and</a:t>
+            </a:r>
+            <a:r>
+              <a:rPr lang="nl-BE" dirty="0"/>
+              <a:t> no </a:t>
+            </a:r>
+            <a:r>
+              <a:rPr lang="nl-BE" dirty="0" err="1"/>
+              <a:t>standards</a:t>
+            </a:r>
+            <a:r>
+              <a:rPr lang="nl-BE" dirty="0"/>
+              <a:t>.</a:t>
+            </a:r>
+          </a:p>
+          <a:p>
+            <a:pPr marL="342900" indent="-342900">
+              <a:buFont typeface="Arial" panose="020B0604020202020204" pitchFamily="34" charset="0"/>
+              <a:buChar char="•"/>
+            </a:pPr>
+            <a:r>
+              <a:rPr lang="nl-BE" dirty="0"/>
+              <a:t>DCS API set </a:t>
+            </a:r>
+            <a:r>
+              <a:rPr lang="nl-BE" dirty="0" err="1"/>
+              <a:t>can</a:t>
+            </a:r>
+            <a:r>
+              <a:rPr lang="nl-BE" dirty="0"/>
+              <a:t> (</a:t>
+            </a:r>
+            <a:r>
+              <a:rPr lang="nl-BE" dirty="0" err="1"/>
+              <a:t>still</a:t>
+            </a:r>
+            <a:r>
+              <a:rPr lang="nl-BE" dirty="0"/>
+              <a:t>) </a:t>
+            </a:r>
+            <a:r>
+              <a:rPr lang="nl-BE" dirty="0" err="1"/>
+              <a:t>contain</a:t>
+            </a:r>
+            <a:r>
+              <a:rPr lang="nl-BE" dirty="0"/>
+              <a:t> bugs, </a:t>
+            </a:r>
+            <a:r>
+              <a:rPr lang="nl-BE" dirty="0" err="1"/>
+              <a:t>which</a:t>
+            </a:r>
+            <a:r>
+              <a:rPr lang="nl-BE" dirty="0"/>
+              <a:t> </a:t>
+            </a:r>
+            <a:r>
+              <a:rPr lang="nl-BE" dirty="0" err="1"/>
+              <a:t>can</a:t>
+            </a:r>
+            <a:r>
+              <a:rPr lang="nl-BE" dirty="0"/>
+              <a:t> have a large impact </a:t>
+            </a:r>
+            <a:r>
+              <a:rPr lang="nl-BE" dirty="0" err="1"/>
+              <a:t>to</a:t>
+            </a:r>
+            <a:r>
+              <a:rPr lang="nl-BE" dirty="0"/>
+              <a:t> </a:t>
+            </a:r>
+            <a:r>
+              <a:rPr lang="nl-BE" dirty="0" err="1"/>
+              <a:t>your</a:t>
+            </a:r>
+            <a:r>
+              <a:rPr lang="nl-BE" dirty="0"/>
+              <a:t> code.</a:t>
+            </a:r>
+          </a:p>
+          <a:p>
+            <a:pPr marL="342900" indent="-342900">
+              <a:buFont typeface="Arial" panose="020B0604020202020204" pitchFamily="34" charset="0"/>
+              <a:buChar char="•"/>
+            </a:pPr>
+            <a:r>
+              <a:rPr lang="nl-BE" dirty="0" err="1"/>
+              <a:t>Lua</a:t>
+            </a:r>
+            <a:r>
+              <a:rPr lang="nl-BE" dirty="0"/>
+              <a:t> </a:t>
+            </a:r>
+            <a:r>
+              <a:rPr lang="nl-BE" dirty="0" err="1"/>
+              <a:t>coding</a:t>
+            </a:r>
+            <a:r>
+              <a:rPr lang="nl-BE" dirty="0"/>
+              <a:t> spread out over </a:t>
+            </a:r>
+            <a:r>
+              <a:rPr lang="nl-BE" dirty="0" err="1"/>
+              <a:t>one</a:t>
+            </a:r>
+            <a:r>
+              <a:rPr lang="nl-BE" dirty="0"/>
+              <a:t> mission file:</a:t>
+            </a:r>
+          </a:p>
+          <a:p>
+            <a:pPr marL="800100" lvl="1" indent="-342900">
+              <a:buFont typeface="Arial" panose="020B0604020202020204" pitchFamily="34" charset="0"/>
+              <a:buChar char="•"/>
+            </a:pPr>
+            <a:r>
+              <a:rPr lang="nl-BE" dirty="0"/>
+              <a:t>In triggers “DO SCRIPT” </a:t>
+            </a:r>
+            <a:r>
+              <a:rPr lang="nl-BE" dirty="0" err="1"/>
+              <a:t>sections</a:t>
+            </a:r>
+            <a:r>
+              <a:rPr lang="nl-BE" dirty="0"/>
+              <a:t>.</a:t>
+            </a:r>
+          </a:p>
+          <a:p>
+            <a:pPr marL="800100" lvl="1" indent="-342900">
+              <a:buFont typeface="Arial" panose="020B0604020202020204" pitchFamily="34" charset="0"/>
+              <a:buChar char="•"/>
+            </a:pPr>
+            <a:r>
+              <a:rPr lang="nl-BE" dirty="0"/>
+              <a:t>In </a:t>
+            </a:r>
+            <a:r>
+              <a:rPr lang="nl-BE" dirty="0" err="1"/>
+              <a:t>lua</a:t>
+            </a:r>
+            <a:r>
+              <a:rPr lang="nl-BE" dirty="0"/>
+              <a:t> </a:t>
+            </a:r>
+            <a:r>
+              <a:rPr lang="nl-BE" dirty="0" err="1"/>
+              <a:t>predicates</a:t>
+            </a:r>
+            <a:r>
+              <a:rPr lang="nl-BE" dirty="0"/>
+              <a:t>.</a:t>
+            </a:r>
+          </a:p>
+          <a:p>
+            <a:pPr marL="800100" lvl="1" indent="-342900">
+              <a:buFont typeface="Arial" panose="020B0604020202020204" pitchFamily="34" charset="0"/>
+              <a:buChar char="•"/>
+            </a:pPr>
+            <a:r>
+              <a:rPr lang="nl-BE" dirty="0"/>
+              <a:t>In </a:t>
+            </a:r>
+            <a:r>
+              <a:rPr lang="nl-BE" dirty="0" err="1"/>
+              <a:t>waypoint</a:t>
+            </a:r>
+            <a:r>
+              <a:rPr lang="nl-BE" dirty="0"/>
+              <a:t> actions.</a:t>
+            </a:r>
+          </a:p>
+          <a:p>
+            <a:pPr marL="800100" lvl="1" indent="-342900">
+              <a:buFont typeface="Arial" panose="020B0604020202020204" pitchFamily="34" charset="0"/>
+              <a:buChar char="•"/>
+            </a:pPr>
+            <a:r>
+              <a:rPr lang="nl-BE" dirty="0"/>
+              <a:t>…</a:t>
+            </a:r>
+          </a:p>
+          <a:p>
+            <a:pPr marL="342900" indent="-342900">
+              <a:buFont typeface="Arial" panose="020B0604020202020204" pitchFamily="34" charset="0"/>
+              <a:buChar char="•"/>
+            </a:pPr>
+            <a:r>
+              <a:rPr lang="nl-BE" dirty="0"/>
+              <a:t>Workflow is hard </a:t>
+            </a:r>
+            <a:r>
+              <a:rPr lang="nl-BE" dirty="0" err="1"/>
+              <a:t>to</a:t>
+            </a:r>
+            <a:r>
+              <a:rPr lang="nl-BE" dirty="0"/>
+              <a:t> follow </a:t>
+            </a:r>
+            <a:r>
+              <a:rPr lang="nl-BE" dirty="0" err="1"/>
+              <a:t>with</a:t>
+            </a:r>
+            <a:r>
+              <a:rPr lang="nl-BE" dirty="0"/>
+              <a:t> </a:t>
+            </a:r>
+            <a:r>
+              <a:rPr lang="nl-BE" dirty="0" err="1"/>
+              <a:t>the</a:t>
+            </a:r>
+            <a:r>
+              <a:rPr lang="nl-BE" dirty="0"/>
+              <a:t> </a:t>
+            </a:r>
+            <a:r>
+              <a:rPr lang="nl-BE" dirty="0" err="1"/>
+              <a:t>tigger</a:t>
+            </a:r>
+            <a:r>
+              <a:rPr lang="nl-BE" dirty="0"/>
+              <a:t> </a:t>
+            </a:r>
+            <a:r>
+              <a:rPr lang="nl-BE" dirty="0" err="1"/>
+              <a:t>mechanism</a:t>
+            </a:r>
+            <a:r>
+              <a:rPr lang="nl-BE" dirty="0"/>
+              <a:t> (</a:t>
+            </a:r>
+            <a:r>
+              <a:rPr lang="nl-BE" dirty="0" err="1"/>
+              <a:t>flags</a:t>
+            </a:r>
+            <a:r>
+              <a:rPr lang="nl-BE" dirty="0"/>
+              <a:t>).</a:t>
+            </a:r>
+          </a:p>
+          <a:p>
+            <a:pPr marL="800100" lvl="1" indent="-342900">
+              <a:buFont typeface="+mj-lt"/>
+              <a:buAutoNum type="arabicPeriod"/>
+            </a:pPr>
             <a:endParaRPr lang="nl-BE" dirty="0"/>
+          </a:p>
+          <a:p>
+            <a:pPr marL="342900" indent="-342900">
+              <a:buFont typeface="+mj-lt"/>
+              <a:buAutoNum type="arabicPeriod"/>
+            </a:pPr>
+            <a:endParaRPr lang="nl-BE" dirty="0"/>
+          </a:p>
+        </p:txBody>
+      </p:sp>
+      <p:sp>
+        <p:nvSpPr>
+          <p:cNvPr id="13" name="Rechthoek 12"/>
+          <p:cNvSpPr/>
+          <p:nvPr/>
+        </p:nvSpPr>
+        <p:spPr>
+          <a:xfrm>
+            <a:off x="605939" y="2168986"/>
+            <a:ext cx="5040055" cy="540006"/>
+          </a:xfrm>
+          <a:prstGeom prst="rect">
+            <a:avLst/>
+          </a:prstGeom>
+          <a:solidFill>
+            <a:schemeClr val="accent1"/>
+          </a:solidFill>
+          <a:ln w="28575"/>
+        </p:spPr>
+        <p:style>
+          <a:lnRef idx="2">
+            <a:schemeClr val="accent1"/>
+          </a:lnRef>
+          <a:fillRef idx="1">
+            <a:schemeClr val="lt1"/>
+          </a:fillRef>
+          <a:effectRef idx="0">
+            <a:schemeClr val="accent1"/>
+          </a:effectRef>
+          <a:fontRef idx="minor">
+            <a:schemeClr val="dk1"/>
+          </a:fontRef>
+        </p:style>
+        <p:txBody>
+          <a:bodyPr rtlCol="0" anchor="ctr"/>
+          <a:lstStyle/>
+          <a:p>
+            <a:pPr algn="ctr"/>
+            <a:r>
+              <a:rPr lang="nl-BE" b="1" dirty="0" err="1">
+                <a:solidFill>
+                  <a:schemeClr val="tx1"/>
+                </a:solidFill>
+              </a:rPr>
+              <a:t>What</a:t>
+            </a:r>
+            <a:r>
+              <a:rPr lang="nl-BE" b="1" dirty="0">
+                <a:solidFill>
+                  <a:schemeClr val="tx1"/>
+                </a:solidFill>
+              </a:rPr>
+              <a:t> I </a:t>
+            </a:r>
+            <a:r>
+              <a:rPr lang="nl-BE" b="1" dirty="0" err="1">
+                <a:solidFill>
+                  <a:schemeClr val="tx1"/>
+                </a:solidFill>
+              </a:rPr>
+              <a:t>experienced</a:t>
+            </a:r>
+            <a:r>
+              <a:rPr lang="nl-BE" b="1" dirty="0">
+                <a:solidFill>
+                  <a:schemeClr val="tx1"/>
+                </a:solidFill>
+              </a:rPr>
+              <a:t> as a mission designer</a:t>
+            </a:r>
+          </a:p>
+        </p:txBody>
+      </p:sp>
+      <p:sp>
+        <p:nvSpPr>
+          <p:cNvPr id="14" name="Rechthoek 13"/>
+          <p:cNvSpPr/>
+          <p:nvPr/>
+        </p:nvSpPr>
+        <p:spPr>
+          <a:xfrm>
+            <a:off x="6546004" y="2168986"/>
+            <a:ext cx="5040057" cy="540006"/>
+          </a:xfrm>
+          <a:prstGeom prst="rect">
+            <a:avLst/>
+          </a:prstGeom>
+          <a:solidFill>
+            <a:schemeClr val="accent1"/>
+          </a:solidFill>
+          <a:ln w="28575"/>
+        </p:spPr>
+        <p:style>
+          <a:lnRef idx="2">
+            <a:schemeClr val="accent1"/>
+          </a:lnRef>
+          <a:fillRef idx="1">
+            <a:schemeClr val="lt1"/>
+          </a:fillRef>
+          <a:effectRef idx="0">
+            <a:schemeClr val="accent1"/>
+          </a:effectRef>
+          <a:fontRef idx="minor">
+            <a:schemeClr val="dk1"/>
+          </a:fontRef>
+        </p:style>
+        <p:txBody>
+          <a:bodyPr rtlCol="0" anchor="ctr"/>
+          <a:lstStyle/>
+          <a:p>
+            <a:pPr algn="ctr"/>
+            <a:r>
+              <a:rPr lang="nl-BE" b="1" dirty="0" err="1">
+                <a:solidFill>
+                  <a:schemeClr val="tx1"/>
+                </a:solidFill>
+              </a:rPr>
+              <a:t>Why</a:t>
+            </a:r>
+            <a:r>
+              <a:rPr lang="nl-BE" b="1" dirty="0">
+                <a:solidFill>
+                  <a:schemeClr val="tx1"/>
+                </a:solidFill>
+              </a:rPr>
+              <a:t> I </a:t>
+            </a:r>
+            <a:r>
+              <a:rPr lang="nl-BE" b="1" dirty="0" err="1">
+                <a:solidFill>
+                  <a:schemeClr val="tx1"/>
+                </a:solidFill>
+              </a:rPr>
+              <a:t>started</a:t>
+            </a:r>
+            <a:r>
+              <a:rPr lang="nl-BE" b="1" dirty="0">
+                <a:solidFill>
+                  <a:schemeClr val="tx1"/>
+                </a:solidFill>
+              </a:rPr>
+              <a:t> </a:t>
+            </a:r>
+            <a:r>
+              <a:rPr lang="nl-BE" b="1" dirty="0" err="1">
+                <a:solidFill>
+                  <a:schemeClr val="tx1"/>
+                </a:solidFill>
+              </a:rPr>
+              <a:t>with</a:t>
+            </a:r>
+            <a:r>
+              <a:rPr lang="nl-BE" b="1" dirty="0">
+                <a:solidFill>
+                  <a:schemeClr val="tx1"/>
+                </a:solidFill>
+              </a:rPr>
+              <a:t> </a:t>
+            </a:r>
+            <a:r>
+              <a:rPr lang="nl-BE" b="1" dirty="0" err="1">
+                <a:solidFill>
+                  <a:schemeClr val="tx1"/>
+                </a:solidFill>
+              </a:rPr>
+              <a:t>the</a:t>
+            </a:r>
+            <a:r>
+              <a:rPr lang="nl-BE" b="1" dirty="0">
+                <a:solidFill>
+                  <a:schemeClr val="tx1"/>
+                </a:solidFill>
+              </a:rPr>
+              <a:t> MOOSE Framework</a:t>
+            </a:r>
+          </a:p>
+        </p:txBody>
+      </p:sp>
+      <p:sp>
+        <p:nvSpPr>
+          <p:cNvPr id="15" name="Pijl-rechts 14"/>
+          <p:cNvSpPr/>
+          <p:nvPr/>
+        </p:nvSpPr>
+        <p:spPr>
+          <a:xfrm>
+            <a:off x="5825997" y="3338999"/>
+            <a:ext cx="540006" cy="2520028"/>
+          </a:xfrm>
+          <a:prstGeom prst="rightArrow">
+            <a:avLst/>
+          </a:prstGeom>
+          <a:ln/>
+        </p:spPr>
+        <p:style>
+          <a:lnRef idx="3">
+            <a:schemeClr val="lt1"/>
+          </a:lnRef>
+          <a:fillRef idx="1">
+            <a:schemeClr val="accent1"/>
+          </a:fillRef>
+          <a:effectRef idx="1">
+            <a:schemeClr val="accent1"/>
+          </a:effectRef>
+          <a:fontRef idx="minor">
+            <a:schemeClr val="lt1"/>
+          </a:fontRef>
+        </p:style>
+        <p:txBody>
+          <a:bodyPr rtlCol="0" anchor="ctr"/>
+          <a:lstStyle/>
+          <a:p>
+            <a:pPr algn="ctr"/>
+            <a:endParaRPr lang="nl-BE"/>
           </a:p>
         </p:txBody>
       </p:sp>
@@ -10001,13 +11154,6 @@
   <p:clrMapOvr>
     <a:masterClrMapping/>
   </p:clrMapOvr>
-  <p:timing>
-    <p:tnLst>
-      <p:par>
-        <p:cTn id="1" dur="indefinite" restart="never" nodeType="tmRoot"/>
-      </p:par>
-    </p:tnLst>
-  </p:timing>
 </p:sld>
 </file>
 
@@ -10044,8 +11190,20 @@
           <a:lstStyle/>
           <a:p>
             <a:r>
+              <a:rPr lang="nl-BE" dirty="0" err="1"/>
+              <a:t>moose</a:t>
+            </a:r>
+            <a:r>
               <a:rPr lang="nl-BE" dirty="0"/>
-              <a:t>The CLASSES</a:t>
+              <a:t> </a:t>
+            </a:r>
+            <a:r>
+              <a:rPr lang="nl-BE" dirty="0" err="1"/>
+              <a:t>wrapper</a:t>
+            </a:r>
+            <a:r>
+              <a:rPr lang="nl-BE" dirty="0"/>
+              <a:t> CLASSES</a:t>
             </a:r>
             <a:endParaRPr lang="en-US" dirty="0"/>
           </a:p>
@@ -10078,23 +11236,21 @@
               <a:rPr lang="nl-BE" dirty="0"/>
               <a:t>MOOSE wraps the DCS objects into </a:t>
             </a:r>
-            <a:endParaRPr lang="nl-BE" dirty="0" smtClean="0"/>
           </a:p>
           <a:p>
             <a:pPr algn="r"/>
             <a:r>
-              <a:rPr lang="nl-BE" dirty="0" smtClean="0"/>
-              <a:t>new </a:t>
-            </a:r>
-            <a:r>
               <a:rPr lang="nl-BE" dirty="0"/>
-              <a:t>CLASSES </a:t>
-            </a:r>
-            <a:r>
-              <a:rPr lang="nl-BE" dirty="0" smtClean="0"/>
-              <a:t>proving a rich API set!</a:t>
-            </a:r>
-            <a:endParaRPr lang="nl-BE" dirty="0"/>
+              <a:t>new CLASSES proving a </a:t>
+            </a:r>
+            <a:r>
+              <a:rPr lang="nl-BE" dirty="0" err="1"/>
+              <a:t>richer</a:t>
+            </a:r>
+            <a:r>
+              <a:rPr lang="nl-BE" dirty="0"/>
+              <a:t> API set!</a:t>
+            </a:r>
           </a:p>
           <a:p>
             <a:pPr algn="r"/>
@@ -10103,16 +11259,8 @@
           <a:p>
             <a:pPr algn="r"/>
             <a:r>
-              <a:rPr lang="nl-BE" dirty="0" smtClean="0"/>
-              <a:t>BASE, GROUP</a:t>
-            </a:r>
-            <a:r>
               <a:rPr lang="nl-BE" dirty="0"/>
-              <a:t>, UNIT, CLIENT, </a:t>
-            </a:r>
-            <a:r>
-              <a:rPr lang="nl-BE" dirty="0" smtClean="0"/>
-              <a:t>. . . , . . . </a:t>
+              <a:t>BASE, GROUP, UNIT, CLIENT, . . . , . . . </a:t>
             </a:r>
             <a:endParaRPr lang="en-US" dirty="0"/>
           </a:p>
@@ -10156,7 +11304,7 @@
           <a:p>
             <a:pPr algn="ctr"/>
             <a:r>
-              <a:rPr lang="nl-BE" b="1" dirty="0" smtClean="0">
+              <a:rPr lang="nl-BE" b="1" dirty="0">
                 <a:solidFill>
                   <a:schemeClr val="accent1"/>
                 </a:solidFill>
@@ -10209,7 +11357,7 @@
           <a:p>
             <a:pPr algn="ctr"/>
             <a:r>
-              <a:rPr lang="nl-BE" b="1" dirty="0" smtClean="0">
+              <a:rPr lang="nl-BE" b="1" dirty="0">
                 <a:solidFill>
                   <a:schemeClr val="accent1"/>
                 </a:solidFill>
@@ -10302,7 +11450,7 @@
           <a:p>
             <a:pPr algn="ctr"/>
             <a:r>
-              <a:rPr lang="nl-BE" b="1" dirty="0" smtClean="0">
+              <a:rPr lang="nl-BE" b="1" dirty="0">
                 <a:solidFill>
                   <a:schemeClr val="accent1"/>
                 </a:solidFill>
@@ -10436,7 +11584,7 @@
           <a:p>
             <a:pPr algn="ctr"/>
             <a:r>
-              <a:rPr lang="nl-BE" b="1" dirty="0" smtClean="0">
+              <a:rPr lang="nl-BE" b="1" dirty="0">
                 <a:solidFill>
                   <a:schemeClr val="accent1"/>
                 </a:solidFill>
@@ -10488,7 +11636,7 @@
           <a:p>
             <a:pPr algn="ctr"/>
             <a:r>
-              <a:rPr lang="nl-BE" sz="1400" b="1" dirty="0" smtClean="0">
+              <a:rPr lang="nl-BE" sz="1400" b="1" dirty="0">
                 <a:solidFill>
                   <a:schemeClr val="bg1"/>
                 </a:solidFill>
@@ -10540,7 +11688,7 @@
           <a:p>
             <a:pPr algn="ctr"/>
             <a:r>
-              <a:rPr lang="nl-BE" sz="1400" b="1" dirty="0" smtClean="0">
+              <a:rPr lang="nl-BE" sz="1400" b="1" dirty="0">
                 <a:solidFill>
                   <a:schemeClr val="bg1"/>
                 </a:solidFill>
@@ -10592,7 +11740,7 @@
           <a:p>
             <a:pPr algn="ctr"/>
             <a:r>
-              <a:rPr lang="nl-BE" sz="1400" b="1" dirty="0" smtClean="0">
+              <a:rPr lang="nl-BE" sz="1400" b="1" dirty="0">
                 <a:solidFill>
                   <a:schemeClr val="bg1"/>
                 </a:solidFill>
@@ -10617,13 +11765,6 @@
   <p:clrMapOvr>
     <a:masterClrMapping/>
   </p:clrMapOvr>
-  <p:timing>
-    <p:tnLst>
-      <p:par>
-        <p:cTn id="1" dur="indefinite" restart="never" nodeType="tmRoot"/>
-      </p:par>
-    </p:tnLst>
-  </p:timing>
 </p:sld>
 </file>
 
@@ -10756,7 +11897,7 @@
           <a:p>
             <a:pPr algn="ctr"/>
             <a:r>
-              <a:rPr lang="nl-BE" b="1" dirty="0" smtClean="0">
+              <a:rPr lang="nl-BE" b="1" dirty="0">
                 <a:solidFill>
                   <a:schemeClr val="tx1"/>
                 </a:solidFill>
@@ -10808,7 +11949,7 @@
           <a:p>
             <a:pPr algn="ctr"/>
             <a:r>
-              <a:rPr lang="nl-BE" sz="1400" b="1" dirty="0" smtClean="0">
+              <a:rPr lang="nl-BE" sz="1400" b="1" dirty="0">
                 <a:solidFill>
                   <a:schemeClr val="tx1"/>
                 </a:solidFill>
@@ -10846,7 +11987,7 @@
           <a:lstStyle/>
           <a:p>
             <a:r>
-              <a:rPr lang="nl-BE" sz="2800" dirty="0" smtClean="0">
+              <a:rPr lang="nl-BE" sz="2800" dirty="0">
                 <a:effectLst>
                   <a:outerShdw blurRad="38100" dist="38100" dir="2700000" algn="tl">
                     <a:srgbClr val="000000">
@@ -10906,7 +12047,7 @@
           <a:p>
             <a:pPr algn="ctr"/>
             <a:r>
-              <a:rPr lang="nl-BE" b="1" dirty="0" smtClean="0">
+              <a:rPr lang="nl-BE" b="1" dirty="0">
                 <a:solidFill>
                   <a:schemeClr val="tx1"/>
                 </a:solidFill>
@@ -10958,7 +12099,7 @@
           <a:p>
             <a:pPr algn="ctr"/>
             <a:r>
-              <a:rPr lang="nl-BE" b="1" dirty="0" smtClean="0">
+              <a:rPr lang="nl-BE" b="1" dirty="0">
                 <a:solidFill>
                   <a:schemeClr val="tx1"/>
                 </a:solidFill>
@@ -11010,7 +12151,7 @@
           <a:p>
             <a:pPr algn="ctr"/>
             <a:r>
-              <a:rPr lang="nl-BE" b="1" dirty="0" smtClean="0">
+              <a:rPr lang="nl-BE" b="1" dirty="0">
                 <a:solidFill>
                   <a:schemeClr val="tx1"/>
                 </a:solidFill>
@@ -11062,7 +12203,7 @@
           <a:p>
             <a:pPr algn="ctr"/>
             <a:r>
-              <a:rPr lang="nl-BE" b="1" dirty="0" smtClean="0">
+              <a:rPr lang="nl-BE" b="1" dirty="0">
                 <a:solidFill>
                   <a:schemeClr val="tx1"/>
                 </a:solidFill>
@@ -11114,7 +12255,7 @@
           <a:p>
             <a:pPr algn="ctr"/>
             <a:r>
-              <a:rPr lang="nl-BE" b="1" dirty="0" smtClean="0">
+              <a:rPr lang="nl-BE" b="1" dirty="0">
                 <a:solidFill>
                   <a:schemeClr val="tx1"/>
                 </a:solidFill>
@@ -11330,7 +12471,7 @@
           <a:p>
             <a:pPr algn="ctr"/>
             <a:r>
-              <a:rPr lang="nl-BE" b="1" dirty="0" smtClean="0">
+              <a:rPr lang="nl-BE" b="1" dirty="0">
                 <a:solidFill>
                   <a:schemeClr val="tx1"/>
                 </a:solidFill>
@@ -11547,7 +12688,7 @@
           <a:p>
             <a:pPr algn="ctr"/>
             <a:r>
-              <a:rPr lang="nl-BE" sz="1400" b="1" dirty="0" smtClean="0">
+              <a:rPr lang="nl-BE" sz="1400" b="1" dirty="0">
                 <a:solidFill>
                   <a:schemeClr val="tx1"/>
                 </a:solidFill>
@@ -11572,13 +12713,6 @@
   <p:clrMapOvr>
     <a:masterClrMapping/>
   </p:clrMapOvr>
-  <p:timing>
-    <p:tnLst>
-      <p:par>
-        <p:cTn id="1" dur="indefinite" restart="never" nodeType="tmRoot"/>
-      </p:par>
-    </p:tnLst>
-  </p:timing>
 </p:sld>
 </file>
 
@@ -11635,20 +12769,12 @@
           <a:lstStyle/>
           <a:p>
             <a:r>
-              <a:rPr lang="nl-BE" b="1" dirty="0" smtClean="0">
+              <a:rPr lang="nl-BE" b="1" dirty="0">
                 <a:solidFill>
                   <a:schemeClr val="tx1"/>
                 </a:solidFill>
               </a:rPr>
-              <a:t>Group </a:t>
-            </a:r>
-            <a:r>
-              <a:rPr lang="nl-BE" b="1" dirty="0">
-                <a:solidFill>
-                  <a:schemeClr val="tx1"/>
-                </a:solidFill>
-              </a:rPr>
-              <a:t>1</a:t>
+              <a:t>Group 1</a:t>
             </a:r>
             <a:endParaRPr lang="en-US" b="1" dirty="0">
               <a:solidFill>
@@ -11717,20 +12843,12 @@
           <a:lstStyle/>
           <a:p>
             <a:r>
-              <a:rPr lang="nl-BE" b="1" dirty="0" smtClean="0">
+              <a:rPr lang="nl-BE" b="1" dirty="0">
                 <a:solidFill>
                   <a:schemeClr val="tx1"/>
                 </a:solidFill>
               </a:rPr>
-              <a:t>Unit </a:t>
-            </a:r>
-            <a:r>
-              <a:rPr lang="nl-BE" b="1" dirty="0">
-                <a:solidFill>
-                  <a:schemeClr val="tx1"/>
-                </a:solidFill>
-              </a:rPr>
-              <a:t>1</a:t>
+              <a:t>Unit 1</a:t>
             </a:r>
           </a:p>
           <a:p>
@@ -11794,20 +12912,12 @@
           <a:lstStyle/>
           <a:p>
             <a:r>
-              <a:rPr lang="nl-BE" b="1" dirty="0" smtClean="0">
+              <a:rPr lang="nl-BE" b="1" dirty="0">
                 <a:solidFill>
                   <a:schemeClr val="tx1"/>
                 </a:solidFill>
               </a:rPr>
-              <a:t>Unit </a:t>
-            </a:r>
-            <a:r>
-              <a:rPr lang="nl-BE" b="1" dirty="0">
-                <a:solidFill>
-                  <a:schemeClr val="tx1"/>
-                </a:solidFill>
-              </a:rPr>
-              <a:t>2</a:t>
+              <a:t>Unit 2</a:t>
             </a:r>
           </a:p>
           <a:p>
@@ -11871,20 +12981,12 @@
           <a:lstStyle/>
           <a:p>
             <a:r>
-              <a:rPr lang="nl-BE" b="1" dirty="0" smtClean="0">
+              <a:rPr lang="nl-BE" b="1" dirty="0">
                 <a:solidFill>
                   <a:schemeClr val="tx1"/>
                 </a:solidFill>
               </a:rPr>
-              <a:t>Unit </a:t>
-            </a:r>
-            <a:r>
-              <a:rPr lang="nl-BE" b="1" dirty="0">
-                <a:solidFill>
-                  <a:schemeClr val="tx1"/>
-                </a:solidFill>
-              </a:rPr>
-              <a:t>3</a:t>
+              <a:t>Unit 3</a:t>
             </a:r>
           </a:p>
           <a:p>
@@ -11956,20 +13058,12 @@
           <a:lstStyle/>
           <a:p>
             <a:r>
-              <a:rPr lang="nl-BE" b="1" dirty="0" smtClean="0">
+              <a:rPr lang="nl-BE" b="1" dirty="0">
                 <a:solidFill>
                   <a:schemeClr val="tx1"/>
                 </a:solidFill>
               </a:rPr>
-              <a:t>Group </a:t>
-            </a:r>
-            <a:r>
-              <a:rPr lang="nl-BE" b="1" dirty="0">
-                <a:solidFill>
-                  <a:schemeClr val="tx1"/>
-                </a:solidFill>
-              </a:rPr>
-              <a:t>2</a:t>
+              <a:t>Group 2</a:t>
             </a:r>
             <a:endParaRPr lang="en-US" b="1" dirty="0">
               <a:solidFill>
@@ -12015,20 +13109,12 @@
           <a:lstStyle/>
           <a:p>
             <a:r>
-              <a:rPr lang="nl-BE" b="1" dirty="0" smtClean="0">
+              <a:rPr lang="nl-BE" b="1" dirty="0">
                 <a:solidFill>
                   <a:schemeClr val="tx1"/>
                 </a:solidFill>
               </a:rPr>
-              <a:t>Unit </a:t>
-            </a:r>
-            <a:r>
-              <a:rPr lang="nl-BE" b="1" dirty="0">
-                <a:solidFill>
-                  <a:schemeClr val="tx1"/>
-                </a:solidFill>
-              </a:rPr>
-              <a:t>4</a:t>
+              <a:t>Unit 4</a:t>
             </a:r>
           </a:p>
           <a:p>
@@ -12092,20 +13178,12 @@
           <a:lstStyle/>
           <a:p>
             <a:r>
-              <a:rPr lang="nl-BE" b="1" dirty="0" smtClean="0">
+              <a:rPr lang="nl-BE" b="1" dirty="0">
                 <a:solidFill>
                   <a:schemeClr val="tx1"/>
                 </a:solidFill>
               </a:rPr>
-              <a:t>Unit </a:t>
-            </a:r>
-            <a:r>
-              <a:rPr lang="nl-BE" b="1" dirty="0">
-                <a:solidFill>
-                  <a:schemeClr val="tx1"/>
-                </a:solidFill>
-              </a:rPr>
-              <a:t>5</a:t>
+              <a:t>Unit 5</a:t>
             </a:r>
           </a:p>
           <a:p>
@@ -12169,20 +13247,12 @@
           <a:lstStyle/>
           <a:p>
             <a:r>
-              <a:rPr lang="nl-BE" b="1" dirty="0" smtClean="0">
+              <a:rPr lang="nl-BE" b="1" dirty="0">
                 <a:solidFill>
                   <a:schemeClr val="tx1"/>
                 </a:solidFill>
               </a:rPr>
-              <a:t>Unit </a:t>
-            </a:r>
-            <a:r>
-              <a:rPr lang="nl-BE" b="1" dirty="0">
-                <a:solidFill>
-                  <a:schemeClr val="tx1"/>
-                </a:solidFill>
-              </a:rPr>
-              <a:t>6</a:t>
+              <a:t>Unit 6</a:t>
             </a:r>
           </a:p>
           <a:p>
@@ -12252,15 +13322,7 @@
                   <a:schemeClr val="tx1"/>
                 </a:solidFill>
               </a:rPr>
-              <a:t>DCS </a:t>
-            </a:r>
-            <a:r>
-              <a:rPr lang="nl-BE" sz="1400" b="1" dirty="0" smtClean="0">
-                <a:solidFill>
-                  <a:schemeClr val="tx1"/>
-                </a:solidFill>
-              </a:rPr>
-              <a:t>Object</a:t>
+              <a:t>DCS Object</a:t>
             </a:r>
             <a:endParaRPr lang="en-US" sz="1400" b="1" dirty="0">
               <a:solidFill>
@@ -12293,7 +13355,7 @@
           <a:lstStyle/>
           <a:p>
             <a:r>
-              <a:rPr lang="nl-BE" sz="2800" dirty="0" smtClean="0">
+              <a:rPr lang="nl-BE" sz="2800" dirty="0">
                 <a:effectLst>
                   <a:outerShdw blurRad="38100" dist="38100" dir="2700000" algn="tl">
                     <a:srgbClr val="000000">
@@ -12326,13 +13388,6 @@
   <p:clrMapOvr>
     <a:masterClrMapping/>
   </p:clrMapOvr>
-  <p:timing>
-    <p:tnLst>
-      <p:par>
-        <p:cTn id="1" dur="indefinite" restart="never" nodeType="tmRoot"/>
-      </p:par>
-    </p:tnLst>
-  </p:timing>
 </p:sld>
 </file>
 
@@ -12441,20 +13496,12 @@
           <a:lstStyle/>
           <a:p>
             <a:r>
-              <a:rPr lang="nl-BE" b="1" dirty="0" smtClean="0">
+              <a:rPr lang="nl-BE" b="1" dirty="0">
                 <a:solidFill>
                   <a:schemeClr val="tx1"/>
                 </a:solidFill>
               </a:rPr>
-              <a:t>Group </a:t>
-            </a:r>
-            <a:r>
-              <a:rPr lang="nl-BE" b="1" dirty="0">
-                <a:solidFill>
-                  <a:schemeClr val="tx1"/>
-                </a:solidFill>
-              </a:rPr>
-              <a:t>1</a:t>
+              <a:t>Group 1</a:t>
             </a:r>
             <a:endParaRPr lang="en-US" b="1" dirty="0">
               <a:solidFill>
@@ -12694,20 +13741,12 @@
           <a:lstStyle/>
           <a:p>
             <a:r>
-              <a:rPr lang="nl-BE" b="1" dirty="0" smtClean="0">
+              <a:rPr lang="nl-BE" b="1" dirty="0">
                 <a:solidFill>
                   <a:schemeClr val="tx1"/>
                 </a:solidFill>
               </a:rPr>
-              <a:t>Unit </a:t>
-            </a:r>
-            <a:r>
-              <a:rPr lang="nl-BE" b="1" dirty="0">
-                <a:solidFill>
-                  <a:schemeClr val="tx1"/>
-                </a:solidFill>
-              </a:rPr>
-              <a:t>1</a:t>
+              <a:t>Unit 1</a:t>
             </a:r>
           </a:p>
           <a:p>
@@ -12771,20 +13810,12 @@
           <a:lstStyle/>
           <a:p>
             <a:r>
-              <a:rPr lang="nl-BE" b="1" dirty="0" smtClean="0">
+              <a:rPr lang="nl-BE" b="1" dirty="0">
                 <a:solidFill>
                   <a:schemeClr val="tx1"/>
                 </a:solidFill>
               </a:rPr>
-              <a:t>Unit </a:t>
-            </a:r>
-            <a:r>
-              <a:rPr lang="nl-BE" b="1" dirty="0">
-                <a:solidFill>
-                  <a:schemeClr val="tx1"/>
-                </a:solidFill>
-              </a:rPr>
-              <a:t>2</a:t>
+              <a:t>Unit 2</a:t>
             </a:r>
           </a:p>
           <a:p>
@@ -12848,20 +13879,12 @@
           <a:lstStyle/>
           <a:p>
             <a:r>
-              <a:rPr lang="nl-BE" b="1" dirty="0" smtClean="0">
+              <a:rPr lang="nl-BE" b="1" dirty="0">
                 <a:solidFill>
                   <a:schemeClr val="tx1"/>
                 </a:solidFill>
               </a:rPr>
-              <a:t>Unit </a:t>
-            </a:r>
-            <a:r>
-              <a:rPr lang="nl-BE" b="1" dirty="0">
-                <a:solidFill>
-                  <a:schemeClr val="tx1"/>
-                </a:solidFill>
-              </a:rPr>
-              <a:t>3</a:t>
+              <a:t>Unit 3</a:t>
             </a:r>
           </a:p>
           <a:p>
@@ -12985,20 +14008,12 @@
           <a:lstStyle/>
           <a:p>
             <a:r>
-              <a:rPr lang="nl-BE" b="1" dirty="0" smtClean="0">
+              <a:rPr lang="nl-BE" b="1" dirty="0">
                 <a:solidFill>
                   <a:schemeClr val="tx1"/>
                 </a:solidFill>
               </a:rPr>
-              <a:t>Group </a:t>
-            </a:r>
-            <a:r>
-              <a:rPr lang="nl-BE" b="1" dirty="0">
-                <a:solidFill>
-                  <a:schemeClr val="tx1"/>
-                </a:solidFill>
-              </a:rPr>
-              <a:t>2</a:t>
+              <a:t>Group 2</a:t>
             </a:r>
             <a:endParaRPr lang="en-US" b="1" dirty="0">
               <a:solidFill>
@@ -13215,20 +14230,12 @@
           <a:lstStyle/>
           <a:p>
             <a:r>
-              <a:rPr lang="nl-BE" b="1" dirty="0" smtClean="0">
+              <a:rPr lang="nl-BE" b="1" dirty="0">
                 <a:solidFill>
                   <a:schemeClr val="tx1"/>
                 </a:solidFill>
               </a:rPr>
-              <a:t>Unit </a:t>
-            </a:r>
-            <a:r>
-              <a:rPr lang="nl-BE" b="1" dirty="0">
-                <a:solidFill>
-                  <a:schemeClr val="tx1"/>
-                </a:solidFill>
-              </a:rPr>
-              <a:t>4</a:t>
+              <a:t>Unit 4</a:t>
             </a:r>
           </a:p>
           <a:p>
@@ -13292,20 +14299,12 @@
           <a:lstStyle/>
           <a:p>
             <a:r>
-              <a:rPr lang="nl-BE" b="1" dirty="0" smtClean="0">
+              <a:rPr lang="nl-BE" b="1" dirty="0">
                 <a:solidFill>
                   <a:schemeClr val="tx1"/>
                 </a:solidFill>
               </a:rPr>
-              <a:t>Unit </a:t>
-            </a:r>
-            <a:r>
-              <a:rPr lang="nl-BE" b="1" dirty="0">
-                <a:solidFill>
-                  <a:schemeClr val="tx1"/>
-                </a:solidFill>
-              </a:rPr>
-              <a:t>5</a:t>
+              <a:t>Unit 5</a:t>
             </a:r>
           </a:p>
           <a:p>
@@ -13369,20 +14368,12 @@
           <a:lstStyle/>
           <a:p>
             <a:r>
-              <a:rPr lang="nl-BE" b="1" dirty="0" smtClean="0">
+              <a:rPr lang="nl-BE" b="1" dirty="0">
                 <a:solidFill>
                   <a:schemeClr val="tx1"/>
                 </a:solidFill>
               </a:rPr>
-              <a:t>Unit </a:t>
-            </a:r>
-            <a:r>
-              <a:rPr lang="nl-BE" b="1" dirty="0">
-                <a:solidFill>
-                  <a:schemeClr val="tx1"/>
-                </a:solidFill>
-              </a:rPr>
-              <a:t>6</a:t>
+              <a:t>Unit 6</a:t>
             </a:r>
           </a:p>
           <a:p>
@@ -13452,15 +14443,7 @@
                   <a:schemeClr val="tx1"/>
                 </a:solidFill>
               </a:rPr>
-              <a:t>DCS </a:t>
-            </a:r>
-            <a:r>
-              <a:rPr lang="nl-BE" sz="1400" b="1" dirty="0" smtClean="0">
-                <a:solidFill>
-                  <a:schemeClr val="tx1"/>
-                </a:solidFill>
-              </a:rPr>
-              <a:t>Object</a:t>
+              <a:t>DCS Object</a:t>
             </a:r>
             <a:endParaRPr lang="en-US" sz="1400" b="1" dirty="0">
               <a:solidFill>
@@ -13557,19 +14540,7 @@
                   </a:outerShdw>
                 </a:effectLst>
               </a:rPr>
-              <a:t>MOOSE </a:t>
-            </a:r>
-            <a:r>
-              <a:rPr lang="nl-BE" sz="2800" dirty="0" smtClean="0">
-                <a:effectLst>
-                  <a:outerShdw blurRad="38100" dist="38100" dir="2700000" algn="tl">
-                    <a:srgbClr val="000000">
-                      <a:alpha val="43137"/>
-                    </a:srgbClr>
-                  </a:outerShdw>
-                </a:effectLst>
-              </a:rPr>
-              <a:t>wraps DCS Objects with wrapper objects</a:t>
+              <a:t>MOOSE wraps DCS Objects with wrapper objects</a:t>
             </a:r>
             <a:endParaRPr lang="en-US" sz="2800" dirty="0">
               <a:effectLst>
@@ -13593,13 +14564,6 @@
   <p:clrMapOvr>
     <a:masterClrMapping/>
   </p:clrMapOvr>
-  <p:timing>
-    <p:tnLst>
-      <p:par>
-        <p:cTn id="1" dur="indefinite" restart="never" nodeType="tmRoot"/>
-      </p:par>
-    </p:tnLst>
-  </p:timing>
 </p:sld>
 </file>
 
@@ -13666,7 +14630,7 @@
           <a:lstStyle/>
           <a:p>
             <a:r>
-              <a:rPr lang="nl-BE" sz="2800" dirty="0" smtClean="0">
+              <a:rPr lang="nl-BE" sz="2800" dirty="0">
                 <a:effectLst>
                   <a:outerShdw blurRad="38100" dist="38100" dir="2700000" algn="tl">
                     <a:srgbClr val="000000">
@@ -13727,7 +14691,7 @@
           <a:p>
             <a:pPr algn="ctr"/>
             <a:r>
-              <a:rPr lang="nl-BE" b="1" dirty="0" smtClean="0">
+              <a:rPr lang="nl-BE" b="1" dirty="0">
                 <a:solidFill>
                   <a:schemeClr val="accent1"/>
                 </a:solidFill>
@@ -13780,7 +14744,7 @@
           <a:p>
             <a:pPr algn="ctr"/>
             <a:r>
-              <a:rPr lang="nl-BE" b="1" dirty="0" smtClean="0">
+              <a:rPr lang="nl-BE" b="1" dirty="0">
                 <a:solidFill>
                   <a:schemeClr val="accent1"/>
                 </a:solidFill>
@@ -13873,7 +14837,7 @@
           <a:p>
             <a:pPr algn="ctr"/>
             <a:r>
-              <a:rPr lang="nl-BE" b="1" dirty="0" smtClean="0">
+              <a:rPr lang="nl-BE" b="1" dirty="0">
                 <a:solidFill>
                   <a:schemeClr val="accent1"/>
                 </a:solidFill>
@@ -13926,7 +14890,7 @@
           <a:p>
             <a:pPr algn="ctr"/>
             <a:r>
-              <a:rPr lang="nl-BE" b="1" dirty="0" smtClean="0">
+              <a:rPr lang="nl-BE" b="1" dirty="0">
                 <a:solidFill>
                   <a:schemeClr val="accent1"/>
                 </a:solidFill>
@@ -13979,7 +14943,7 @@
           <a:p>
             <a:pPr algn="ctr"/>
             <a:r>
-              <a:rPr lang="nl-BE" b="1" dirty="0" smtClean="0">
+              <a:rPr lang="nl-BE" b="1" dirty="0">
                 <a:solidFill>
                   <a:schemeClr val="accent1"/>
                 </a:solidFill>
@@ -14156,7 +15120,7 @@
           <a:p>
             <a:pPr algn="ctr"/>
             <a:r>
-              <a:rPr lang="nl-BE" b="1" dirty="0" smtClean="0">
+              <a:rPr lang="nl-BE" b="1" dirty="0">
                 <a:solidFill>
                   <a:schemeClr val="accent1"/>
                 </a:solidFill>
@@ -14419,7 +15383,7 @@
           <a:p>
             <a:pPr algn="ctr"/>
             <a:r>
-              <a:rPr lang="nl-BE" sz="1400" b="1" dirty="0" smtClean="0">
+              <a:rPr lang="nl-BE" sz="1400" b="1" dirty="0">
                 <a:solidFill>
                   <a:schemeClr val="tx1"/>
                 </a:solidFill>
@@ -14471,7 +15435,7 @@
           <a:p>
             <a:pPr algn="ctr"/>
             <a:r>
-              <a:rPr lang="nl-BE" sz="1400" b="1" dirty="0" smtClean="0">
+              <a:rPr lang="nl-BE" sz="1400" b="1" dirty="0">
                 <a:solidFill>
                   <a:schemeClr val="tx1"/>
                 </a:solidFill>
@@ -14523,7 +15487,7 @@
           <a:p>
             <a:pPr algn="ctr"/>
             <a:r>
-              <a:rPr lang="nl-BE" sz="1400" b="1" dirty="0" smtClean="0">
+              <a:rPr lang="nl-BE" sz="1400" b="1" dirty="0">
                 <a:solidFill>
                   <a:schemeClr val="tx1"/>
                 </a:solidFill>
@@ -14548,13 +15512,6 @@
   <p:clrMapOvr>
     <a:masterClrMapping/>
   </p:clrMapOvr>
-  <p:timing>
-    <p:tnLst>
-      <p:par>
-        <p:cTn id="1" dur="indefinite" restart="never" nodeType="tmRoot"/>
-      </p:par>
-    </p:tnLst>
-  </p:timing>
 </p:sld>
 </file>
 
@@ -14621,7 +15578,7 @@
           <a:lstStyle/>
           <a:p>
             <a:r>
-              <a:rPr lang="nl-BE" sz="2800" dirty="0" smtClean="0">
+              <a:rPr lang="nl-BE" sz="2800" dirty="0">
                 <a:effectLst>
                   <a:outerShdw blurRad="38100" dist="38100" dir="2700000" algn="tl">
                     <a:srgbClr val="000000">
@@ -14682,7 +15639,7 @@
           <a:p>
             <a:pPr algn="ctr"/>
             <a:r>
-              <a:rPr lang="nl-BE" b="1" dirty="0" smtClean="0">
+              <a:rPr lang="nl-BE" b="1" dirty="0">
                 <a:solidFill>
                   <a:schemeClr val="accent1"/>
                 </a:solidFill>
@@ -14735,7 +15692,7 @@
           <a:p>
             <a:pPr algn="ctr"/>
             <a:r>
-              <a:rPr lang="nl-BE" b="1" dirty="0" smtClean="0">
+              <a:rPr lang="nl-BE" b="1" dirty="0">
                 <a:solidFill>
                   <a:schemeClr val="accent1"/>
                 </a:solidFill>
@@ -14828,7 +15785,7 @@
           <a:p>
             <a:pPr algn="ctr"/>
             <a:r>
-              <a:rPr lang="nl-BE" b="1" dirty="0" smtClean="0">
+              <a:rPr lang="nl-BE" b="1" dirty="0">
                 <a:solidFill>
                   <a:schemeClr val="accent1"/>
                 </a:solidFill>
@@ -14881,7 +15838,7 @@
           <a:p>
             <a:pPr algn="ctr"/>
             <a:r>
-              <a:rPr lang="nl-BE" b="1" dirty="0" smtClean="0">
+              <a:rPr lang="nl-BE" b="1" dirty="0">
                 <a:solidFill>
                   <a:schemeClr val="accent1"/>
                 </a:solidFill>
@@ -14934,7 +15891,7 @@
           <a:p>
             <a:pPr algn="ctr"/>
             <a:r>
-              <a:rPr lang="nl-BE" b="1" dirty="0" smtClean="0">
+              <a:rPr lang="nl-BE" b="1" dirty="0">
                 <a:solidFill>
                   <a:schemeClr val="accent1"/>
                 </a:solidFill>
@@ -15111,7 +16068,7 @@
           <a:p>
             <a:pPr algn="ctr"/>
             <a:r>
-              <a:rPr lang="nl-BE" b="1" dirty="0" smtClean="0">
+              <a:rPr lang="nl-BE" b="1" dirty="0">
                 <a:solidFill>
                   <a:schemeClr val="accent1"/>
                 </a:solidFill>
@@ -15274,20 +16231,12 @@
           </a:lstStyle>
           <a:p>
             <a:r>
-              <a:rPr lang="nl-BE" sz="1600" dirty="0" smtClean="0">
+              <a:rPr lang="nl-BE" sz="1600" dirty="0">
                 <a:solidFill>
                   <a:schemeClr val="accent1"/>
                 </a:solidFill>
               </a:rPr>
-              <a:t>Core </a:t>
-            </a:r>
-            <a:r>
-              <a:rPr lang="nl-BE" sz="1600" dirty="0">
-                <a:solidFill>
-                  <a:schemeClr val="accent1"/>
-                </a:solidFill>
-              </a:rPr>
-              <a:t>mechanism of inheritance.</a:t>
+              <a:t>Core mechanism of inheritance.</a:t>
             </a:r>
           </a:p>
           <a:p>
@@ -15364,13 +16313,6 @@
   <p:clrMapOvr>
     <a:masterClrMapping/>
   </p:clrMapOvr>
-  <p:timing>
-    <p:tnLst>
-      <p:par>
-        <p:cTn id="1" dur="indefinite" restart="never" nodeType="tmRoot"/>
-      </p:par>
-    </p:tnLst>
-  </p:timing>
 </p:sld>
 </file>
 
@@ -15437,7 +16379,7 @@
           <a:lstStyle/>
           <a:p>
             <a:r>
-              <a:rPr lang="nl-BE" sz="2800" dirty="0" smtClean="0">
+              <a:rPr lang="nl-BE" sz="2800" dirty="0">
                 <a:effectLst>
                   <a:outerShdw blurRad="38100" dist="38100" dir="2700000" algn="tl">
                     <a:srgbClr val="000000">
@@ -15644,7 +16586,7 @@
           <a:p>
             <a:pPr algn="ctr"/>
             <a:r>
-              <a:rPr lang="nl-BE" b="1" dirty="0" smtClean="0">
+              <a:rPr lang="nl-BE" b="1" dirty="0">
                 <a:solidFill>
                   <a:schemeClr val="accent1"/>
                 </a:solidFill>
@@ -15697,7 +16639,7 @@
           <a:p>
             <a:pPr algn="ctr"/>
             <a:r>
-              <a:rPr lang="nl-BE" b="1" dirty="0" smtClean="0">
+              <a:rPr lang="nl-BE" b="1" dirty="0">
                 <a:solidFill>
                   <a:schemeClr val="accent1"/>
                 </a:solidFill>
@@ -15750,7 +16692,7 @@
           <a:p>
             <a:pPr algn="ctr"/>
             <a:r>
-              <a:rPr lang="nl-BE" b="1" dirty="0" smtClean="0">
+              <a:rPr lang="nl-BE" b="1" dirty="0">
                 <a:solidFill>
                   <a:schemeClr val="accent1"/>
                 </a:solidFill>
@@ -15927,7 +16869,7 @@
           <a:p>
             <a:pPr algn="ctr"/>
             <a:r>
-              <a:rPr lang="nl-BE" b="1" dirty="0" smtClean="0">
+              <a:rPr lang="nl-BE" b="1" dirty="0">
                 <a:solidFill>
                   <a:schemeClr val="accent1"/>
                 </a:solidFill>
@@ -16090,7 +17032,7 @@
           </a:lstStyle>
           <a:p>
             <a:r>
-              <a:rPr lang="nl-BE" sz="1600" dirty="0" smtClean="0">
+              <a:rPr lang="nl-BE" sz="1600" dirty="0">
                 <a:solidFill>
                   <a:schemeClr val="accent1"/>
                 </a:solidFill>
@@ -16100,20 +17042,12 @@
           </a:p>
           <a:p>
             <a:r>
-              <a:rPr lang="nl-BE" sz="1600" dirty="0" smtClean="0">
+              <a:rPr lang="nl-BE" sz="1600" dirty="0">
                 <a:solidFill>
                   <a:schemeClr val="accent1"/>
                 </a:solidFill>
               </a:rPr>
-              <a:t>Support </a:t>
-            </a:r>
-            <a:r>
-              <a:rPr lang="nl-BE" sz="1600" dirty="0">
-                <a:solidFill>
-                  <a:schemeClr val="accent1"/>
-                </a:solidFill>
-              </a:rPr>
-              <a:t>all Unit DCS APIs.</a:t>
+              <a:t>Support all Unit DCS APIs.</a:t>
             </a:r>
           </a:p>
           <a:p>
@@ -16215,7 +17149,7 @@
           <a:p>
             <a:pPr algn="ctr"/>
             <a:r>
-              <a:rPr lang="nl-BE" sz="1400" b="1" dirty="0" smtClean="0">
+              <a:rPr lang="nl-BE" sz="1400" b="1" dirty="0">
                 <a:solidFill>
                   <a:schemeClr val="tx1"/>
                 </a:solidFill>
@@ -16240,13 +17174,6 @@
   <p:clrMapOvr>
     <a:masterClrMapping/>
   </p:clrMapOvr>
-  <p:timing>
-    <p:tnLst>
-      <p:par>
-        <p:cTn id="1" dur="indefinite" restart="never" nodeType="tmRoot"/>
-      </p:par>
-    </p:tnLst>
-  </p:timing>
 </p:sld>
 </file>
 

</xml_diff>